<commit_message>
Update Program and PresentationSheet
</commit_message>
<xml_diff>
--- a/Tournaments/2023_04_JapanOpen/プレゼンシート/PresentationSheet.pptx
+++ b/Tournaments/2023_04_JapanOpen/プレゼンシート/PresentationSheet.pptx
@@ -11,7 +11,7 @@
     <p:sldId id="256" r:id="rId2"/>
   </p:sldIdLst>
   <p:sldSz cx="15119350" cy="10691813"/>
-  <p:notesSz cx="6858000" cy="9144000"/>
+  <p:notesSz cx="9869488" cy="14295438"/>
   <p:defaultTextStyle>
     <a:defPPr>
       <a:defRPr lang="ja-JP"/>
@@ -695,11 +695,11 @@
           <c:showBubbleSize val="0"/>
         </c:dLbls>
         <c:smooth val="0"/>
-        <c:axId val="1934516800"/>
-        <c:axId val="1934520608"/>
+        <c:axId val="2116775840"/>
+        <c:axId val="2116776928"/>
       </c:lineChart>
       <c:catAx>
-        <c:axId val="1934516800"/>
+        <c:axId val="2116775840"/>
         <c:scaling>
           <c:orientation val="minMax"/>
         </c:scaling>
@@ -742,7 +742,7 @@
             <a:endParaRPr lang="ja-JP"/>
           </a:p>
         </c:txPr>
-        <c:crossAx val="1934520608"/>
+        <c:crossAx val="2116776928"/>
         <c:crosses val="autoZero"/>
         <c:auto val="1"/>
         <c:lblAlgn val="ctr"/>
@@ -750,7 +750,7 @@
         <c:noMultiLvlLbl val="0"/>
       </c:catAx>
       <c:valAx>
-        <c:axId val="1934520608"/>
+        <c:axId val="2116776928"/>
         <c:scaling>
           <c:orientation val="minMax"/>
         </c:scaling>
@@ -801,7 +801,7 @@
             <a:endParaRPr lang="ja-JP"/>
           </a:p>
         </c:txPr>
-        <c:crossAx val="1934516800"/>
+        <c:crossAx val="2116775840"/>
         <c:crosses val="autoZero"/>
         <c:crossBetween val="between"/>
       </c:valAx>
@@ -1074,11 +1074,11 @@
         </c:dLbls>
         <c:marker val="1"/>
         <c:smooth val="0"/>
-        <c:axId val="1934505920"/>
-        <c:axId val="1934506464"/>
+        <c:axId val="2116776384"/>
+        <c:axId val="2116771488"/>
       </c:lineChart>
       <c:catAx>
-        <c:axId val="1934505920"/>
+        <c:axId val="2116776384"/>
         <c:scaling>
           <c:orientation val="minMax"/>
         </c:scaling>
@@ -1121,7 +1121,7 @@
             <a:endParaRPr lang="ja-JP"/>
           </a:p>
         </c:txPr>
-        <c:crossAx val="1934506464"/>
+        <c:crossAx val="2116771488"/>
         <c:crosses val="autoZero"/>
         <c:auto val="1"/>
         <c:lblAlgn val="ctr"/>
@@ -1129,7 +1129,7 @@
         <c:noMultiLvlLbl val="0"/>
       </c:catAx>
       <c:valAx>
-        <c:axId val="1934506464"/>
+        <c:axId val="2116771488"/>
         <c:scaling>
           <c:orientation val="minMax"/>
         </c:scaling>
@@ -1180,7 +1180,7 @@
             <a:endParaRPr lang="ja-JP"/>
           </a:p>
         </c:txPr>
-        <c:crossAx val="1934505920"/>
+        <c:crossAx val="2116776384"/>
         <c:crosses val="autoZero"/>
         <c:crossBetween val="between"/>
       </c:valAx>
@@ -1435,11 +1435,11 @@
         </c:dLbls>
         <c:marker val="1"/>
         <c:smooth val="0"/>
-        <c:axId val="1934507552"/>
-        <c:axId val="1934509184"/>
+        <c:axId val="2116773120"/>
+        <c:axId val="2116773664"/>
       </c:lineChart>
       <c:catAx>
-        <c:axId val="1934507552"/>
+        <c:axId val="2116773120"/>
         <c:scaling>
           <c:orientation val="minMax"/>
         </c:scaling>
@@ -1482,7 +1482,7 @@
             <a:endParaRPr lang="ja-JP"/>
           </a:p>
         </c:txPr>
-        <c:crossAx val="1934509184"/>
+        <c:crossAx val="2116773664"/>
         <c:crosses val="autoZero"/>
         <c:auto val="1"/>
         <c:lblAlgn val="ctr"/>
@@ -1490,7 +1490,7 @@
         <c:noMultiLvlLbl val="0"/>
       </c:catAx>
       <c:valAx>
-        <c:axId val="1934509184"/>
+        <c:axId val="2116773664"/>
         <c:scaling>
           <c:orientation val="minMax"/>
         </c:scaling>
@@ -1541,7 +1541,7 @@
             <a:endParaRPr lang="ja-JP"/>
           </a:p>
         </c:txPr>
-        <c:crossAx val="1934507552"/>
+        <c:crossAx val="2116773120"/>
         <c:crosses val="autoZero"/>
         <c:crossBetween val="between"/>
       </c:valAx>
@@ -3284,18 +3284,18 @@
         </p:nvSpPr>
         <p:spPr>
           <a:xfrm>
-            <a:off x="0" y="0"/>
-            <a:ext cx="2971800" cy="458788"/>
+            <a:off x="1" y="0"/>
+            <a:ext cx="4276779" cy="717254"/>
           </a:xfrm>
           <a:prstGeom prst="rect">
             <a:avLst/>
           </a:prstGeom>
         </p:spPr>
         <p:txBody>
-          <a:bodyPr vert="horz" lIns="91440" tIns="45720" rIns="91440" bIns="45720" rtlCol="0"/>
+          <a:bodyPr vert="horz" lIns="133063" tIns="66532" rIns="133063" bIns="66532" rtlCol="0"/>
           <a:lstStyle>
             <a:lvl1pPr algn="l">
-              <a:defRPr sz="1200"/>
+              <a:defRPr sz="1700"/>
             </a:lvl1pPr>
           </a:lstStyle>
           <a:p>
@@ -3315,24 +3315,24 @@
         </p:nvSpPr>
         <p:spPr>
           <a:xfrm>
-            <a:off x="3884613" y="0"/>
-            <a:ext cx="2971800" cy="458788"/>
+            <a:off x="5590426" y="0"/>
+            <a:ext cx="4276779" cy="717254"/>
           </a:xfrm>
           <a:prstGeom prst="rect">
             <a:avLst/>
           </a:prstGeom>
         </p:spPr>
         <p:txBody>
-          <a:bodyPr vert="horz" lIns="91440" tIns="45720" rIns="91440" bIns="45720" rtlCol="0"/>
+          <a:bodyPr vert="horz" lIns="133063" tIns="66532" rIns="133063" bIns="66532" rtlCol="0"/>
           <a:lstStyle>
             <a:lvl1pPr algn="r">
-              <a:defRPr sz="1200"/>
+              <a:defRPr sz="1700"/>
             </a:lvl1pPr>
           </a:lstStyle>
           <a:p>
             <a:fld id="{3F98CC91-C364-4B3B-82FA-AC506B25D13D}" type="datetimeFigureOut">
               <a:rPr kumimoji="1" lang="ja-JP" altLang="en-US" smtClean="0"/>
-              <a:t>2023/3/14</a:t>
+              <a:t>2023/3/15</a:t>
             </a:fld>
             <a:endParaRPr kumimoji="1" lang="ja-JP" altLang="en-US"/>
           </a:p>
@@ -3350,8 +3350,8 @@
         </p:nvSpPr>
         <p:spPr>
           <a:xfrm>
-            <a:off x="1246188" y="1143000"/>
-            <a:ext cx="4365625" cy="3086100"/>
+            <a:off x="1524000" y="1785938"/>
+            <a:ext cx="6821488" cy="4824412"/>
           </a:xfrm>
           <a:prstGeom prst="rect">
             <a:avLst/>
@@ -3364,7 +3364,7 @@
           </a:ln>
         </p:spPr>
         <p:txBody>
-          <a:bodyPr vert="horz" lIns="91440" tIns="45720" rIns="91440" bIns="45720" rtlCol="0" anchor="ctr"/>
+          <a:bodyPr vert="horz" lIns="133063" tIns="66532" rIns="133063" bIns="66532" rtlCol="0" anchor="ctr"/>
           <a:lstStyle/>
           <a:p>
             <a:endParaRPr lang="ja-JP" altLang="en-US"/>
@@ -3383,15 +3383,15 @@
         </p:nvSpPr>
         <p:spPr>
           <a:xfrm>
-            <a:off x="685800" y="4400550"/>
-            <a:ext cx="5486400" cy="3600450"/>
+            <a:off x="986950" y="6879680"/>
+            <a:ext cx="7895590" cy="5628829"/>
           </a:xfrm>
           <a:prstGeom prst="rect">
             <a:avLst/>
           </a:prstGeom>
         </p:spPr>
         <p:txBody>
-          <a:bodyPr vert="horz" lIns="91440" tIns="45720" rIns="91440" bIns="45720" rtlCol="0"/>
+          <a:bodyPr vert="horz" lIns="133063" tIns="66532" rIns="133063" bIns="66532" rtlCol="0"/>
           <a:lstStyle/>
           <a:p>
             <a:pPr lvl="0"/>
@@ -3475,18 +3475,18 @@
         </p:nvSpPr>
         <p:spPr>
           <a:xfrm>
-            <a:off x="0" y="8685213"/>
-            <a:ext cx="2971800" cy="458787"/>
+            <a:off x="1" y="13578186"/>
+            <a:ext cx="4276779" cy="717253"/>
           </a:xfrm>
           <a:prstGeom prst="rect">
             <a:avLst/>
           </a:prstGeom>
         </p:spPr>
         <p:txBody>
-          <a:bodyPr vert="horz" lIns="91440" tIns="45720" rIns="91440" bIns="45720" rtlCol="0" anchor="b"/>
+          <a:bodyPr vert="horz" lIns="133063" tIns="66532" rIns="133063" bIns="66532" rtlCol="0" anchor="b"/>
           <a:lstStyle>
             <a:lvl1pPr algn="l">
-              <a:defRPr sz="1200"/>
+              <a:defRPr sz="1700"/>
             </a:lvl1pPr>
           </a:lstStyle>
           <a:p>
@@ -3506,18 +3506,18 @@
         </p:nvSpPr>
         <p:spPr>
           <a:xfrm>
-            <a:off x="3884613" y="8685213"/>
-            <a:ext cx="2971800" cy="458787"/>
+            <a:off x="5590426" y="13578186"/>
+            <a:ext cx="4276779" cy="717253"/>
           </a:xfrm>
           <a:prstGeom prst="rect">
             <a:avLst/>
           </a:prstGeom>
         </p:spPr>
         <p:txBody>
-          <a:bodyPr vert="horz" lIns="91440" tIns="45720" rIns="91440" bIns="45720" rtlCol="0" anchor="b"/>
+          <a:bodyPr vert="horz" lIns="133063" tIns="66532" rIns="133063" bIns="66532" rtlCol="0" anchor="b"/>
           <a:lstStyle>
             <a:lvl1pPr algn="r">
-              <a:defRPr sz="1200"/>
+              <a:defRPr sz="1700"/>
             </a:lvl1pPr>
           </a:lstStyle>
           <a:p>
@@ -3847,7 +3847,7 @@
           <a:p>
             <a:fld id="{B22FF90D-8F5D-4FFE-A8AC-DC55650B53DE}" type="datetimeFigureOut">
               <a:rPr kumimoji="1" lang="ja-JP" altLang="en-US" smtClean="0"/>
-              <a:t>2023/3/14</a:t>
+              <a:t>2023/3/15</a:t>
             </a:fld>
             <a:endParaRPr kumimoji="1" lang="ja-JP" altLang="en-US"/>
           </a:p>
@@ -4049,7 +4049,7 @@
           <a:p>
             <a:fld id="{B22FF90D-8F5D-4FFE-A8AC-DC55650B53DE}" type="datetimeFigureOut">
               <a:rPr kumimoji="1" lang="ja-JP" altLang="en-US" smtClean="0"/>
-              <a:t>2023/3/14</a:t>
+              <a:t>2023/3/15</a:t>
             </a:fld>
             <a:endParaRPr kumimoji="1" lang="ja-JP" altLang="en-US"/>
           </a:p>
@@ -4261,7 +4261,7 @@
           <a:p>
             <a:fld id="{B22FF90D-8F5D-4FFE-A8AC-DC55650B53DE}" type="datetimeFigureOut">
               <a:rPr kumimoji="1" lang="ja-JP" altLang="en-US" smtClean="0"/>
-              <a:t>2023/3/14</a:t>
+              <a:t>2023/3/15</a:t>
             </a:fld>
             <a:endParaRPr kumimoji="1" lang="ja-JP" altLang="en-US"/>
           </a:p>
@@ -4463,7 +4463,7 @@
           <a:p>
             <a:fld id="{B22FF90D-8F5D-4FFE-A8AC-DC55650B53DE}" type="datetimeFigureOut">
               <a:rPr kumimoji="1" lang="ja-JP" altLang="en-US" smtClean="0"/>
-              <a:t>2023/3/14</a:t>
+              <a:t>2023/3/15</a:t>
             </a:fld>
             <a:endParaRPr kumimoji="1" lang="ja-JP" altLang="en-US"/>
           </a:p>
@@ -4707,7 +4707,7 @@
           <a:p>
             <a:fld id="{B22FF90D-8F5D-4FFE-A8AC-DC55650B53DE}" type="datetimeFigureOut">
               <a:rPr kumimoji="1" lang="ja-JP" altLang="en-US" smtClean="0"/>
-              <a:t>2023/3/14</a:t>
+              <a:t>2023/3/15</a:t>
             </a:fld>
             <a:endParaRPr kumimoji="1" lang="ja-JP" altLang="en-US"/>
           </a:p>
@@ -5003,7 +5003,7 @@
           <a:p>
             <a:fld id="{B22FF90D-8F5D-4FFE-A8AC-DC55650B53DE}" type="datetimeFigureOut">
               <a:rPr kumimoji="1" lang="ja-JP" altLang="en-US" smtClean="0"/>
-              <a:t>2023/3/14</a:t>
+              <a:t>2023/3/15</a:t>
             </a:fld>
             <a:endParaRPr kumimoji="1" lang="ja-JP" altLang="en-US"/>
           </a:p>
@@ -5434,7 +5434,7 @@
           <a:p>
             <a:fld id="{B22FF90D-8F5D-4FFE-A8AC-DC55650B53DE}" type="datetimeFigureOut">
               <a:rPr kumimoji="1" lang="ja-JP" altLang="en-US" smtClean="0"/>
-              <a:t>2023/3/14</a:t>
+              <a:t>2023/3/15</a:t>
             </a:fld>
             <a:endParaRPr kumimoji="1" lang="ja-JP" altLang="en-US"/>
           </a:p>
@@ -5552,7 +5552,7 @@
           <a:p>
             <a:fld id="{B22FF90D-8F5D-4FFE-A8AC-DC55650B53DE}" type="datetimeFigureOut">
               <a:rPr kumimoji="1" lang="ja-JP" altLang="en-US" smtClean="0"/>
-              <a:t>2023/3/14</a:t>
+              <a:t>2023/3/15</a:t>
             </a:fld>
             <a:endParaRPr kumimoji="1" lang="ja-JP" altLang="en-US"/>
           </a:p>
@@ -5647,7 +5647,7 @@
           <a:p>
             <a:fld id="{B22FF90D-8F5D-4FFE-A8AC-DC55650B53DE}" type="datetimeFigureOut">
               <a:rPr kumimoji="1" lang="ja-JP" altLang="en-US" smtClean="0"/>
-              <a:t>2023/3/14</a:t>
+              <a:t>2023/3/15</a:t>
             </a:fld>
             <a:endParaRPr kumimoji="1" lang="ja-JP" altLang="en-US"/>
           </a:p>
@@ -5956,7 +5956,7 @@
           <a:p>
             <a:fld id="{B22FF90D-8F5D-4FFE-A8AC-DC55650B53DE}" type="datetimeFigureOut">
               <a:rPr kumimoji="1" lang="ja-JP" altLang="en-US" smtClean="0"/>
-              <a:t>2023/3/14</a:t>
+              <a:t>2023/3/15</a:t>
             </a:fld>
             <a:endParaRPr kumimoji="1" lang="ja-JP" altLang="en-US"/>
           </a:p>
@@ -6213,7 +6213,7 @@
           <a:p>
             <a:fld id="{B22FF90D-8F5D-4FFE-A8AC-DC55650B53DE}" type="datetimeFigureOut">
               <a:rPr kumimoji="1" lang="ja-JP" altLang="en-US" smtClean="0"/>
-              <a:t>2023/3/14</a:t>
+              <a:t>2023/3/15</a:t>
             </a:fld>
             <a:endParaRPr kumimoji="1" lang="ja-JP" altLang="en-US"/>
           </a:p>
@@ -6458,7 +6458,7 @@
           <a:p>
             <a:fld id="{B22FF90D-8F5D-4FFE-A8AC-DC55650B53DE}" type="datetimeFigureOut">
               <a:rPr kumimoji="1" lang="ja-JP" altLang="en-US" smtClean="0"/>
-              <a:t>2023/3/14</a:t>
+              <a:t>2023/3/15</a:t>
             </a:fld>
             <a:endParaRPr kumimoji="1" lang="ja-JP" altLang="en-US"/>
           </a:p>
@@ -7219,7 +7219,7 @@
           <p:cNvPr id="15" name="正方形/長方形 14">
             <a:extLst>
               <a:ext uri="{FF2B5EF4-FFF2-40B4-BE49-F238E27FC236}">
-                <a16:creationId xmlns="" xmlns:a16="http://schemas.microsoft.com/office/drawing/2014/main" id="{5810ADF1-2FA9-68BA-C87E-15996A67411A}"/>
+                <a16:creationId xmlns:a16="http://schemas.microsoft.com/office/drawing/2014/main" xmlns="" id="{5810ADF1-2FA9-68BA-C87E-15996A67411A}"/>
               </a:ext>
             </a:extLst>
           </p:cNvPr>
@@ -7316,7 +7316,7 @@
             <p:cNvPr id="17" name="四角形: 角を丸くする 16">
               <a:extLst>
                 <a:ext uri="{FF2B5EF4-FFF2-40B4-BE49-F238E27FC236}">
-                  <a16:creationId xmlns="" xmlns:a16="http://schemas.microsoft.com/office/drawing/2014/main" id="{9CAD2B58-8EC7-250F-70BF-EBDD6823213A}"/>
+                  <a16:creationId xmlns:a16="http://schemas.microsoft.com/office/drawing/2014/main" xmlns="" id="{9CAD2B58-8EC7-250F-70BF-EBDD6823213A}"/>
                 </a:ext>
               </a:extLst>
             </p:cNvPr>
@@ -7769,7 +7769,7 @@
             <p:cNvPr id="143" name="四角形: 角を丸くする 16">
               <a:extLst>
                 <a:ext uri="{FF2B5EF4-FFF2-40B4-BE49-F238E27FC236}">
-                  <a16:creationId xmlns="" xmlns:a16="http://schemas.microsoft.com/office/drawing/2014/main" id="{9CAD2B58-8EC7-250F-70BF-EBDD6823213A}"/>
+                  <a16:creationId xmlns:a16="http://schemas.microsoft.com/office/drawing/2014/main" xmlns="" id="{9CAD2B58-8EC7-250F-70BF-EBDD6823213A}"/>
                 </a:ext>
               </a:extLst>
             </p:cNvPr>
@@ -7881,21 +7881,7 @@
                   <a:latin typeface="源ノ角ゴシック Code JP N" panose="020B0400000000000000" pitchFamily="34" charset="-128"/>
                   <a:ea typeface="源ノ角ゴシック Code JP N" panose="020B0400000000000000" pitchFamily="34" charset="-128"/>
                 </a:rPr>
-                <a:t>せる</a:t>
-              </a:r>
-              <a:r>
-                <a:rPr kumimoji="1" lang="ja-JP" altLang="en-US" sz="800" dirty="0" smtClean="0">
-                  <a:latin typeface="源ノ角ゴシック Code JP N" panose="020B0400000000000000" pitchFamily="34" charset="-128"/>
-                  <a:ea typeface="源ノ角ゴシック Code JP N" panose="020B0400000000000000" pitchFamily="34" charset="-128"/>
-                </a:rPr>
-                <a:t>ことで、ロボット</a:t>
-              </a:r>
-              <a:r>
-                <a:rPr kumimoji="1" lang="ja-JP" altLang="en-US" sz="800" dirty="0" smtClean="0">
-                  <a:latin typeface="源ノ角ゴシック Code JP N" panose="020B0400000000000000" pitchFamily="34" charset="-128"/>
-                  <a:ea typeface="源ノ角ゴシック Code JP N" panose="020B0400000000000000" pitchFamily="34" charset="-128"/>
-                </a:rPr>
-                <a:t>が</a:t>
+                <a:t>せることで、ロボットが</a:t>
               </a:r>
               <a:r>
                 <a:rPr lang="ja-JP" altLang="en-US" sz="800" dirty="0">
@@ -7909,14 +7895,7 @@
                   <a:latin typeface="源ノ角ゴシック Code JP N" panose="020B0400000000000000" pitchFamily="34" charset="-128"/>
                   <a:ea typeface="源ノ角ゴシック Code JP N" panose="020B0400000000000000" pitchFamily="34" charset="-128"/>
                 </a:rPr>
-                <a:t>ボール</a:t>
-              </a:r>
-              <a:r>
-                <a:rPr kumimoji="1" lang="ja-JP" altLang="en-US" sz="800" dirty="0" smtClean="0">
-                  <a:latin typeface="源ノ角ゴシック Code JP N" panose="020B0400000000000000" pitchFamily="34" charset="-128"/>
-                  <a:ea typeface="源ノ角ゴシック Code JP N" panose="020B0400000000000000" pitchFamily="34" charset="-128"/>
-                </a:rPr>
-                <a:t>を運ぶよりも</a:t>
+                <a:t>ボールを運ぶよりも</a:t>
               </a:r>
               <a:endParaRPr kumimoji="1" lang="en-US" altLang="ja-JP" sz="800" dirty="0" smtClean="0">
                 <a:latin typeface="源ノ角ゴシック Code JP N" panose="020B0400000000000000" pitchFamily="34" charset="-128"/>
@@ -7962,21 +7941,7 @@
                   <a:latin typeface="源ノ角ゴシック Code JP N" panose="020B0400000000000000" pitchFamily="34" charset="-128"/>
                   <a:ea typeface="源ノ角ゴシック Code JP N" panose="020B0400000000000000" pitchFamily="34" charset="-128"/>
                 </a:rPr>
-                <a:t>シュートできるため、ゴールに入る前に相手ロボットと接触していてもプッシングを</a:t>
-              </a:r>
-              <a:r>
-                <a:rPr lang="ja-JP" altLang="en-US" sz="800" dirty="0" smtClean="0">
-                  <a:latin typeface="源ノ角ゴシック Code JP N" panose="020B0400000000000000" pitchFamily="34" charset="-128"/>
-                  <a:ea typeface="源ノ角ゴシック Code JP N" panose="020B0400000000000000" pitchFamily="34" charset="-128"/>
-                </a:rPr>
-                <a:t>取られず、</a:t>
-              </a:r>
-              <a:r>
-                <a:rPr lang="ja-JP" altLang="en-US" sz="800" dirty="0" smtClean="0">
-                  <a:latin typeface="源ノ角ゴシック Code JP N" panose="020B0400000000000000" pitchFamily="34" charset="-128"/>
-                  <a:ea typeface="源ノ角ゴシック Code JP N" panose="020B0400000000000000" pitchFamily="34" charset="-128"/>
-                </a:rPr>
-                <a:t>必然的にゴールに入る回数が増えることになります。また、キック機構と他の機能を一緒に用いることで、より強力なシュートを打つことができます。例えば、カメラを用いてゴールの方向を向きながらボールをキックすることで、前を向いてキックするよりもはるかにゴールへのシュート率を上げることができます。また、自陣を守るロボットであっても、前方にボールをキックすること</a:t>
+                <a:t>シュートできるため、ゴールに入る前に相手ロボットと接触していてもプッシングを取られず、必然的にゴールに入る回数が増えることになります。また、キック機構と他の機能を一緒に用いることで、より強力なシュートを打つことができます。例えば、カメラを用いてゴールの方向を向きながらボールをキックすることで、前を向いてキックするよりもはるかにゴールへのシュート率を上げることができます。また、自陣を守るロボットであっても、前方にボールをキックすること</a:t>
               </a:r>
               <a:r>
                 <a:rPr lang="ja-JP" altLang="en-US" sz="800" dirty="0">
@@ -8025,7 +7990,7 @@
             <p:cNvPr id="146" name="四角形: 角を丸くする 16">
               <a:extLst>
                 <a:ext uri="{FF2B5EF4-FFF2-40B4-BE49-F238E27FC236}">
-                  <a16:creationId xmlns="" xmlns:a16="http://schemas.microsoft.com/office/drawing/2014/main" id="{9CAD2B58-8EC7-250F-70BF-EBDD6823213A}"/>
+                  <a16:creationId xmlns:a16="http://schemas.microsoft.com/office/drawing/2014/main" xmlns="" id="{9CAD2B58-8EC7-250F-70BF-EBDD6823213A}"/>
                 </a:ext>
               </a:extLst>
             </p:cNvPr>
@@ -8171,28 +8136,7 @@
                   <a:latin typeface="源ノ角ゴシック Code JP N" panose="020B0400000000000000" pitchFamily="34" charset="-128"/>
                   <a:ea typeface="源ノ角ゴシック Code JP N" panose="020B0400000000000000" pitchFamily="34" charset="-128"/>
                 </a:rPr>
-                <a:t>います。このカメラを用いて、コートの中心</a:t>
-              </a:r>
-              <a:r>
-                <a:rPr lang="ja-JP" altLang="en-US" sz="800" dirty="0" smtClean="0">
-                  <a:latin typeface="源ノ角ゴシック Code JP N" panose="020B0400000000000000" pitchFamily="34" charset="-128"/>
-                  <a:ea typeface="源ノ角ゴシック Code JP N" panose="020B0400000000000000" pitchFamily="34" charset="-128"/>
-                </a:rPr>
-                <a:t>の位置、青</a:t>
-              </a:r>
-              <a:r>
-                <a:rPr lang="ja-JP" altLang="en-US" sz="800" dirty="0" smtClean="0">
-                  <a:latin typeface="源ノ角ゴシック Code JP N" panose="020B0400000000000000" pitchFamily="34" charset="-128"/>
-                  <a:ea typeface="源ノ角ゴシック Code JP N" panose="020B0400000000000000" pitchFamily="34" charset="-128"/>
-                </a:rPr>
-                <a:t>・黄ゴール</a:t>
-              </a:r>
-              <a:r>
-                <a:rPr lang="ja-JP" altLang="en-US" sz="800" dirty="0" smtClean="0">
-                  <a:latin typeface="源ノ角ゴシック Code JP N" panose="020B0400000000000000" pitchFamily="34" charset="-128"/>
-                  <a:ea typeface="源ノ角ゴシック Code JP N" panose="020B0400000000000000" pitchFamily="34" charset="-128"/>
-                </a:rPr>
-                <a:t>の位置を取得して</a:t>
+                <a:t>います。このカメラを用いて、コートの中心の位置、青・黄ゴールの位置を取得して</a:t>
               </a:r>
               <a:r>
                 <a:rPr lang="ja-JP" altLang="en-US" sz="800" dirty="0">
@@ -8206,28 +8150,7 @@
                   <a:latin typeface="源ノ角ゴシック Code JP N" panose="020B0400000000000000" pitchFamily="34" charset="-128"/>
                   <a:ea typeface="源ノ角ゴシック Code JP N" panose="020B0400000000000000" pitchFamily="34" charset="-128"/>
                 </a:rPr>
-                <a:t>これらのデータ</a:t>
-              </a:r>
-              <a:r>
-                <a:rPr lang="ja-JP" altLang="en-US" sz="800" dirty="0" smtClean="0">
-                  <a:latin typeface="源ノ角ゴシック Code JP N" panose="020B0400000000000000" pitchFamily="34" charset="-128"/>
-                  <a:ea typeface="源ノ角ゴシック Code JP N" panose="020B0400000000000000" pitchFamily="34" charset="-128"/>
-                </a:rPr>
-                <a:t>を用いること</a:t>
-              </a:r>
-              <a:r>
-                <a:rPr lang="ja-JP" altLang="en-US" sz="800" dirty="0" smtClean="0">
-                  <a:latin typeface="源ノ角ゴシック Code JP N" panose="020B0400000000000000" pitchFamily="34" charset="-128"/>
-                  <a:ea typeface="源ノ角ゴシック Code JP N" panose="020B0400000000000000" pitchFamily="34" charset="-128"/>
-                </a:rPr>
-                <a:t>で</a:t>
-              </a:r>
-              <a:r>
-                <a:rPr lang="ja-JP" altLang="en-US" sz="800" dirty="0" smtClean="0">
-                  <a:latin typeface="源ノ角ゴシック Code JP N" panose="020B0400000000000000" pitchFamily="34" charset="-128"/>
-                  <a:ea typeface="源ノ角ゴシック Code JP N" panose="020B0400000000000000" pitchFamily="34" charset="-128"/>
-                </a:rPr>
-                <a:t>、</a:t>
+                <a:t>これらのデータを用いることで、</a:t>
               </a:r>
               <a:endParaRPr lang="en-US" altLang="ja-JP" sz="800" dirty="0" smtClean="0">
                 <a:latin typeface="源ノ角ゴシック Code JP N" panose="020B0400000000000000" pitchFamily="34" charset="-128"/>
@@ -8240,14 +8163,7 @@
                   <a:latin typeface="源ノ角ゴシック Code JP N" panose="020B0400000000000000" pitchFamily="34" charset="-128"/>
                   <a:ea typeface="源ノ角ゴシック Code JP N" panose="020B0400000000000000" pitchFamily="34" charset="-128"/>
                 </a:rPr>
-                <a:t>現在</a:t>
-              </a:r>
-              <a:r>
-                <a:rPr lang="ja-JP" altLang="en-US" sz="800" dirty="0" smtClean="0">
-                  <a:latin typeface="源ノ角ゴシック Code JP N" panose="020B0400000000000000" pitchFamily="34" charset="-128"/>
-                  <a:ea typeface="源ノ角ゴシック Code JP N" panose="020B0400000000000000" pitchFamily="34" charset="-128"/>
-                </a:rPr>
-                <a:t>自分がコートの中心からどの</a:t>
+                <a:t>現在自分がコートの中心からどの</a:t>
               </a:r>
               <a:r>
                 <a:rPr lang="ja-JP" altLang="en-US" sz="800" dirty="0">
@@ -8261,21 +8177,7 @@
                   <a:latin typeface="源ノ角ゴシック Code JP N" panose="020B0400000000000000" pitchFamily="34" charset="-128"/>
                   <a:ea typeface="源ノ角ゴシック Code JP N" panose="020B0400000000000000" pitchFamily="34" charset="-128"/>
                 </a:rPr>
-                <a:t>の角度・距離にいるのかを知ることができたり、常に相手のゴールの方向を見ながらボールを運ぶことを可能にしました。カメラを使うことで、リアルタイムで常にコートの状況</a:t>
-              </a:r>
-              <a:r>
-                <a:rPr lang="ja-JP" altLang="en-US" sz="800" dirty="0" smtClean="0">
-                  <a:latin typeface="源ノ角ゴシック Code JP N" panose="020B0400000000000000" pitchFamily="34" charset="-128"/>
-                  <a:ea typeface="源ノ角ゴシック Code JP N" panose="020B0400000000000000" pitchFamily="34" charset="-128"/>
-                </a:rPr>
-                <a:t>を知ることが</a:t>
-              </a:r>
-              <a:r>
-                <a:rPr lang="ja-JP" altLang="en-US" sz="800" dirty="0" smtClean="0">
-                  <a:latin typeface="源ノ角ゴシック Code JP N" panose="020B0400000000000000" pitchFamily="34" charset="-128"/>
-                  <a:ea typeface="源ノ角ゴシック Code JP N" panose="020B0400000000000000" pitchFamily="34" charset="-128"/>
-                </a:rPr>
-                <a:t>できるため、たとえロボットがゴールの一部を隠したとして</a:t>
+                <a:t>の角度・距離にいるのかを知ることができたり、常に相手のゴールの方向を見ながらボールを運ぶことを可能にしました。カメラを使うことで、リアルタイムで常にコートの状況を知ることができるため、たとえロボットがゴールの一部を隠したとして</a:t>
               </a:r>
               <a:r>
                 <a:rPr lang="ja-JP" altLang="en-US" sz="800" dirty="0">
@@ -8309,14 +8211,7 @@
                   <a:latin typeface="源ノ角ゴシック Code JP N" panose="020B0400000000000000" pitchFamily="34" charset="-128"/>
                   <a:ea typeface="源ノ角ゴシック Code JP N" panose="020B0400000000000000" pitchFamily="34" charset="-128"/>
                 </a:rPr>
-                <a:t>、ディフェンス機では、自陣のゴール</a:t>
-              </a:r>
-              <a:r>
-                <a:rPr lang="ja-JP" altLang="en-US" sz="800" dirty="0" smtClean="0">
-                  <a:latin typeface="源ノ角ゴシック Code JP N" panose="020B0400000000000000" pitchFamily="34" charset="-128"/>
-                  <a:ea typeface="源ノ角ゴシック Code JP N" panose="020B0400000000000000" pitchFamily="34" charset="-128"/>
-                </a:rPr>
-                <a:t>の位置を取得する</a:t>
+                <a:t>、ディフェンス機では、自陣のゴールの位置を取得する</a:t>
               </a:r>
               <a:endParaRPr lang="en-US" altLang="ja-JP" sz="800" dirty="0" smtClean="0">
                 <a:latin typeface="源ノ角ゴシック Code JP N" panose="020B0400000000000000" pitchFamily="34" charset="-128"/>
@@ -8329,14 +8224,7 @@
                   <a:latin typeface="源ノ角ゴシック Code JP N" panose="020B0400000000000000" pitchFamily="34" charset="-128"/>
                   <a:ea typeface="源ノ角ゴシック Code JP N" panose="020B0400000000000000" pitchFamily="34" charset="-128"/>
                 </a:rPr>
-                <a:t>ことで、</a:t>
-              </a:r>
-              <a:r>
-                <a:rPr lang="ja-JP" altLang="en-US" sz="800" dirty="0" smtClean="0">
-                  <a:latin typeface="源ノ角ゴシック Code JP N" panose="020B0400000000000000" pitchFamily="34" charset="-128"/>
-                  <a:ea typeface="源ノ角ゴシック Code JP N" panose="020B0400000000000000" pitchFamily="34" charset="-128"/>
-                </a:rPr>
-                <a:t>相手ロボットから自陣を守るという行動をとれるように</a:t>
+                <a:t>ことで、相手ロボットから自陣を守るという行動をとれるように</a:t>
               </a:r>
               <a:endParaRPr lang="en-US" altLang="ja-JP" sz="800" dirty="0" smtClean="0">
                 <a:latin typeface="源ノ角ゴシック Code JP N" panose="020B0400000000000000" pitchFamily="34" charset="-128"/>
@@ -8378,7 +8266,7 @@
             <p:cNvPr id="150" name="四角形: 角を丸くする 16">
               <a:extLst>
                 <a:ext uri="{FF2B5EF4-FFF2-40B4-BE49-F238E27FC236}">
-                  <a16:creationId xmlns="" xmlns:a16="http://schemas.microsoft.com/office/drawing/2014/main" id="{9CAD2B58-8EC7-250F-70BF-EBDD6823213A}"/>
+                  <a16:creationId xmlns:a16="http://schemas.microsoft.com/office/drawing/2014/main" xmlns="" id="{9CAD2B58-8EC7-250F-70BF-EBDD6823213A}"/>
                 </a:ext>
               </a:extLst>
             </p:cNvPr>
@@ -8517,28 +8405,7 @@
                   <a:latin typeface="源ノ角ゴシック Code JP N" panose="020B0400000000000000" pitchFamily="34" charset="-128"/>
                   <a:ea typeface="源ノ角ゴシック Code JP N" panose="020B0400000000000000" pitchFamily="34" charset="-128"/>
                 </a:rPr>
-                <a:t>「速く、正確に」を</a:t>
-              </a:r>
-              <a:r>
-                <a:rPr lang="ja-JP" altLang="en-US" sz="700" dirty="0" smtClean="0">
-                  <a:latin typeface="源ノ角ゴシック Code JP N" panose="020B0400000000000000" pitchFamily="34" charset="-128"/>
-                  <a:ea typeface="源ノ角ゴシック Code JP N" panose="020B0400000000000000" pitchFamily="34" charset="-128"/>
-                </a:rPr>
-                <a:t>目指しており、</a:t>
-              </a:r>
-              <a:r>
-                <a:rPr lang="ja-JP" altLang="en-US" sz="700" dirty="0" smtClean="0">
-                  <a:latin typeface="源ノ角ゴシック Code JP N" panose="020B0400000000000000" pitchFamily="34" charset="-128"/>
-                  <a:ea typeface="源ノ角ゴシック Code JP N" panose="020B0400000000000000" pitchFamily="34" charset="-128"/>
-                </a:rPr>
-                <a:t>正確さをとるために速さを犠牲にしたく</a:t>
-              </a:r>
-              <a:r>
-                <a:rPr lang="ja-JP" altLang="en-US" sz="700" dirty="0" smtClean="0">
-                  <a:latin typeface="源ノ角ゴシック Code JP N" panose="020B0400000000000000" pitchFamily="34" charset="-128"/>
-                  <a:ea typeface="源ノ角ゴシック Code JP N" panose="020B0400000000000000" pitchFamily="34" charset="-128"/>
-                </a:rPr>
-                <a:t>ないの</a:t>
+                <a:t>「速く、正確に」を目指しており、正確さをとるために速さを犠牲にしたくないの</a:t>
               </a:r>
               <a:r>
                 <a:rPr lang="ja-JP" altLang="en-US" sz="700" dirty="0">
@@ -8552,21 +8419,7 @@
                   <a:latin typeface="源ノ角ゴシック Code JP N" panose="020B0400000000000000" pitchFamily="34" charset="-128"/>
                   <a:ea typeface="源ノ角ゴシック Code JP N" panose="020B0400000000000000" pitchFamily="34" charset="-128"/>
                 </a:rPr>
-                <a:t>、</a:t>
-              </a:r>
-              <a:r>
-                <a:rPr lang="ja-JP" altLang="en-US" sz="700" dirty="0" smtClean="0">
-                  <a:latin typeface="源ノ角ゴシック Code JP N" panose="020B0400000000000000" pitchFamily="34" charset="-128"/>
-                  <a:ea typeface="源ノ角ゴシック Code JP N" panose="020B0400000000000000" pitchFamily="34" charset="-128"/>
-                </a:rPr>
-                <a:t>速さ・正確さ</a:t>
-              </a:r>
-              <a:r>
-                <a:rPr lang="ja-JP" altLang="en-US" sz="700" dirty="0" smtClean="0">
-                  <a:latin typeface="源ノ角ゴシック Code JP N" panose="020B0400000000000000" pitchFamily="34" charset="-128"/>
-                  <a:ea typeface="源ノ角ゴシック Code JP N" panose="020B0400000000000000" pitchFamily="34" charset="-128"/>
-                </a:rPr>
-                <a:t>を</a:t>
+                <a:t>、速さ・正確さを</a:t>
               </a:r>
               <a:endParaRPr lang="en-US" altLang="ja-JP" sz="700" dirty="0" smtClean="0">
                 <a:latin typeface="源ノ角ゴシック Code JP N" panose="020B0400000000000000" pitchFamily="34" charset="-128"/>
@@ -8579,14 +8432,7 @@
                   <a:latin typeface="源ノ角ゴシック Code JP N" panose="020B0400000000000000" pitchFamily="34" charset="-128"/>
                   <a:ea typeface="源ノ角ゴシック Code JP N" panose="020B0400000000000000" pitchFamily="34" charset="-128"/>
                 </a:rPr>
-                <a:t>両立</a:t>
-              </a:r>
-              <a:r>
-                <a:rPr lang="ja-JP" altLang="en-US" sz="700" dirty="0" smtClean="0">
-                  <a:latin typeface="源ノ角ゴシック Code JP N" panose="020B0400000000000000" pitchFamily="34" charset="-128"/>
-                  <a:ea typeface="源ノ角ゴシック Code JP N" panose="020B0400000000000000" pitchFamily="34" charset="-128"/>
-                </a:rPr>
-                <a:t>させるギリギリを探す必要がありました。そこで、モータのスピードによってどのくらい白線の外に出てしまうのか、という</a:t>
+                <a:t>両立させるギリギリを探す必要がありました。そこで、モータのスピードによってどのくらい白線の外に出てしまうのか、という</a:t>
               </a:r>
               <a:r>
                 <a:rPr lang="ja-JP" altLang="en-US" sz="700" dirty="0">
@@ -8600,14 +8446,7 @@
                   <a:latin typeface="源ノ角ゴシック Code JP N" panose="020B0400000000000000" pitchFamily="34" charset="-128"/>
                   <a:ea typeface="源ノ角ゴシック Code JP N" panose="020B0400000000000000" pitchFamily="34" charset="-128"/>
                 </a:rPr>
-                <a:t>を行いました</a:t>
-              </a:r>
-              <a:r>
-                <a:rPr lang="ja-JP" altLang="en-US" sz="700" dirty="0" smtClean="0">
-                  <a:latin typeface="源ノ角ゴシック Code JP N" panose="020B0400000000000000" pitchFamily="34" charset="-128"/>
-                  <a:ea typeface="源ノ角ゴシック Code JP N" panose="020B0400000000000000" pitchFamily="34" charset="-128"/>
-                </a:rPr>
-                <a:t>。</a:t>
+                <a:t>を行いました。</a:t>
               </a:r>
               <a:endParaRPr lang="en-US" altLang="ja-JP" sz="700" dirty="0">
                 <a:latin typeface="源ノ角ゴシック Code JP N" panose="020B0400000000000000" pitchFamily="34" charset="-128"/>
@@ -8865,7 +8704,7 @@
             <p:cNvPr id="160" name="四角形: 角を丸くする 16">
               <a:extLst>
                 <a:ext uri="{FF2B5EF4-FFF2-40B4-BE49-F238E27FC236}">
-                  <a16:creationId xmlns="" xmlns:a16="http://schemas.microsoft.com/office/drawing/2014/main" id="{9CAD2B58-8EC7-250F-70BF-EBDD6823213A}"/>
+                  <a16:creationId xmlns:a16="http://schemas.microsoft.com/office/drawing/2014/main" xmlns="" id="{9CAD2B58-8EC7-250F-70BF-EBDD6823213A}"/>
                 </a:ext>
               </a:extLst>
             </p:cNvPr>
@@ -8987,7 +8826,7 @@
             <p:cNvPr id="166" name="四角形: 角を丸くする 16">
               <a:extLst>
                 <a:ext uri="{FF2B5EF4-FFF2-40B4-BE49-F238E27FC236}">
-                  <a16:creationId xmlns="" xmlns:a16="http://schemas.microsoft.com/office/drawing/2014/main" id="{9CAD2B58-8EC7-250F-70BF-EBDD6823213A}"/>
+                  <a16:creationId xmlns:a16="http://schemas.microsoft.com/office/drawing/2014/main" xmlns="" id="{9CAD2B58-8EC7-250F-70BF-EBDD6823213A}"/>
                 </a:ext>
               </a:extLst>
             </p:cNvPr>
@@ -9738,8 +9577,8 @@
         </p:blipFill>
         <p:spPr>
           <a:xfrm>
-            <a:off x="7116811" y="9783989"/>
-            <a:ext cx="653715" cy="653715"/>
+            <a:off x="7219756" y="9874067"/>
+            <a:ext cx="594678" cy="594678"/>
           </a:xfrm>
           <a:prstGeom prst="rect">
             <a:avLst/>
@@ -9768,8 +9607,8 @@
         </p:blipFill>
         <p:spPr>
           <a:xfrm>
-            <a:off x="7577919" y="10012162"/>
-            <a:ext cx="467932" cy="467932"/>
+            <a:off x="7644791" y="10080235"/>
+            <a:ext cx="372740" cy="372740"/>
           </a:xfrm>
           <a:prstGeom prst="rect">
             <a:avLst/>
@@ -9797,8 +9636,8 @@
         </p:blipFill>
         <p:spPr>
           <a:xfrm>
-            <a:off x="8829335" y="9928731"/>
-            <a:ext cx="781051" cy="550845"/>
+            <a:off x="8840912" y="9962940"/>
+            <a:ext cx="684260" cy="482582"/>
           </a:xfrm>
           <a:prstGeom prst="rect">
             <a:avLst/>
@@ -9827,8 +9666,8 @@
         </p:blipFill>
         <p:spPr>
           <a:xfrm>
-            <a:off x="9675078" y="9806403"/>
-            <a:ext cx="655129" cy="655129"/>
+            <a:off x="9610046" y="9957380"/>
+            <a:ext cx="497498" cy="497498"/>
           </a:xfrm>
           <a:prstGeom prst="rect">
             <a:avLst/>
@@ -13377,37 +13216,7 @@
                   <a:latin typeface="源ノ角ゴシック Code JP N" panose="020B0400000000000000" pitchFamily="34" charset="-128"/>
                   <a:ea typeface="源ノ角ゴシック Code JP N" panose="020B0400000000000000" pitchFamily="34" charset="-128"/>
                 </a:rPr>
-                <a:t>この</a:t>
-              </a:r>
-              <a:r>
-                <a:rPr lang="ja-JP" altLang="en-US" sz="500" dirty="0" smtClean="0">
-                  <a:solidFill>
-                    <a:schemeClr val="tx1"/>
-                  </a:solidFill>
-                  <a:latin typeface="源ノ角ゴシック Code JP N" panose="020B0400000000000000" pitchFamily="34" charset="-128"/>
-                  <a:ea typeface="源ノ角ゴシック Code JP N" panose="020B0400000000000000" pitchFamily="34" charset="-128"/>
-                </a:rPr>
-                <a:t>長さを</a:t>
-              </a:r>
-              <a:r>
-                <a:rPr lang="ja-JP" altLang="en-US" sz="500" dirty="0" smtClean="0">
-                  <a:solidFill>
-                    <a:schemeClr val="tx1"/>
-                  </a:solidFill>
-                  <a:latin typeface="源ノ角ゴシック Code JP N" panose="020B0400000000000000" pitchFamily="34" charset="-128"/>
-                  <a:ea typeface="源ノ角ゴシック Code JP N" panose="020B0400000000000000" pitchFamily="34" charset="-128"/>
-                </a:rPr>
-                <a:t>計測</a:t>
-              </a:r>
-              <a:r>
-                <a:rPr lang="ja-JP" altLang="en-US" sz="500" dirty="0" smtClean="0">
-                  <a:solidFill>
-                    <a:schemeClr val="tx1"/>
-                  </a:solidFill>
-                  <a:latin typeface="源ノ角ゴシック Code JP N" panose="020B0400000000000000" pitchFamily="34" charset="-128"/>
-                  <a:ea typeface="源ノ角ゴシック Code JP N" panose="020B0400000000000000" pitchFamily="34" charset="-128"/>
-                </a:rPr>
-                <a:t>する</a:t>
+                <a:t>この長さを計測する</a:t>
               </a:r>
               <a:endParaRPr lang="en-US" altLang="ja-JP" sz="500" dirty="0" smtClean="0">
                 <a:solidFill>
@@ -14058,7 +13867,7 @@
               <p:cNvPr id="12" name="四角形: 角を丸くする 11">
                 <a:extLst>
                   <a:ext uri="{FF2B5EF4-FFF2-40B4-BE49-F238E27FC236}">
-                    <a16:creationId xmlns="" xmlns:a16="http://schemas.microsoft.com/office/drawing/2014/main" id="{EFCF447B-DF4E-F420-B181-5ED79E9170AE}"/>
+                    <a16:creationId xmlns:a16="http://schemas.microsoft.com/office/drawing/2014/main" xmlns="" id="{EFCF447B-DF4E-F420-B181-5ED79E9170AE}"/>
                   </a:ext>
                 </a:extLst>
               </p:cNvPr>
@@ -14484,7 +14293,7 @@
               <p:cNvPr id="47" name="四角形: 角を丸くする 11">
                 <a:extLst>
                   <a:ext uri="{FF2B5EF4-FFF2-40B4-BE49-F238E27FC236}">
-                    <a16:creationId xmlns="" xmlns:a16="http://schemas.microsoft.com/office/drawing/2014/main" id="{EFCF447B-DF4E-F420-B181-5ED79E9170AE}"/>
+                    <a16:creationId xmlns:a16="http://schemas.microsoft.com/office/drawing/2014/main" xmlns="" id="{EFCF447B-DF4E-F420-B181-5ED79E9170AE}"/>
                   </a:ext>
                 </a:extLst>
               </p:cNvPr>
@@ -14687,7 +14496,7 @@
             <p:cNvPr id="55" name="四角形: 角を丸くする 11">
               <a:extLst>
                 <a:ext uri="{FF2B5EF4-FFF2-40B4-BE49-F238E27FC236}">
-                  <a16:creationId xmlns="" xmlns:a16="http://schemas.microsoft.com/office/drawing/2014/main" id="{EFCF447B-DF4E-F420-B181-5ED79E9170AE}"/>
+                  <a16:creationId xmlns:a16="http://schemas.microsoft.com/office/drawing/2014/main" xmlns="" id="{EFCF447B-DF4E-F420-B181-5ED79E9170AE}"/>
                 </a:ext>
               </a:extLst>
             </p:cNvPr>
@@ -14766,7 +14575,7 @@
             <p:cNvPr id="57" name="四角形: 角を丸くする 11">
               <a:extLst>
                 <a:ext uri="{FF2B5EF4-FFF2-40B4-BE49-F238E27FC236}">
-                  <a16:creationId xmlns="" xmlns:a16="http://schemas.microsoft.com/office/drawing/2014/main" id="{EFCF447B-DF4E-F420-B181-5ED79E9170AE}"/>
+                  <a16:creationId xmlns:a16="http://schemas.microsoft.com/office/drawing/2014/main" xmlns="" id="{EFCF447B-DF4E-F420-B181-5ED79E9170AE}"/>
                 </a:ext>
               </a:extLst>
             </p:cNvPr>
@@ -17842,7 +17651,7 @@
             <p:cNvPr id="397" name="四角形: 角を丸くする 11">
               <a:extLst>
                 <a:ext uri="{FF2B5EF4-FFF2-40B4-BE49-F238E27FC236}">
-                  <a16:creationId xmlns="" xmlns:a16="http://schemas.microsoft.com/office/drawing/2014/main" id="{EFCF447B-DF4E-F420-B181-5ED79E9170AE}"/>
+                  <a16:creationId xmlns:a16="http://schemas.microsoft.com/office/drawing/2014/main" xmlns="" id="{EFCF447B-DF4E-F420-B181-5ED79E9170AE}"/>
                 </a:ext>
               </a:extLst>
             </p:cNvPr>
@@ -17985,55 +17794,7 @@
                   <a:latin typeface="源ノ角ゴシック Code JP N" panose="020B0400000000000000" pitchFamily="34" charset="-128"/>
                   <a:ea typeface="源ノ角ゴシック Code JP N" panose="020B0400000000000000" pitchFamily="34" charset="-128"/>
                 </a:rPr>
-                <a:t>モーター</a:t>
-              </a:r>
-              <a:r>
-                <a:rPr lang="ja-JP" altLang="en-US" sz="800" dirty="0" smtClean="0">
-                  <a:solidFill>
-                    <a:schemeClr val="bg2">
-                      <a:lumMod val="25000"/>
-                    </a:schemeClr>
-                  </a:solidFill>
-                  <a:latin typeface="源ノ角ゴシック Code JP N" panose="020B0400000000000000" pitchFamily="34" charset="-128"/>
-                  <a:ea typeface="源ノ角ゴシック Code JP N" panose="020B0400000000000000" pitchFamily="34" charset="-128"/>
-                </a:rPr>
-                <a:t>制御や画面</a:t>
-              </a:r>
-              <a:r>
-                <a:rPr lang="ja-JP" altLang="en-US" sz="800" dirty="0" smtClean="0">
-                  <a:solidFill>
-                    <a:schemeClr val="bg2">
-                      <a:lumMod val="25000"/>
-                    </a:schemeClr>
-                  </a:solidFill>
-                  <a:latin typeface="源ノ角ゴシック Code JP N" panose="020B0400000000000000" pitchFamily="34" charset="-128"/>
-                  <a:ea typeface="源ノ角ゴシック Code JP N" panose="020B0400000000000000" pitchFamily="34" charset="-128"/>
-                </a:rPr>
-                <a:t>表示など</a:t>
-              </a:r>
-              <a:r>
-                <a:rPr lang="ja-JP" altLang="en-US" sz="800" dirty="0" smtClean="0">
-                  <a:solidFill>
-                    <a:schemeClr val="bg2">
-                      <a:lumMod val="25000"/>
-                    </a:schemeClr>
-                  </a:solidFill>
-                  <a:latin typeface="源ノ角ゴシック Code JP N" panose="020B0400000000000000" pitchFamily="34" charset="-128"/>
-                  <a:ea typeface="源ノ角ゴシック Code JP N" panose="020B0400000000000000" pitchFamily="34" charset="-128"/>
-                </a:rPr>
-                <a:t>の</a:t>
-              </a:r>
-              <a:r>
-                <a:rPr lang="ja-JP" altLang="en-US" sz="800" dirty="0" smtClean="0">
-                  <a:solidFill>
-                    <a:schemeClr val="bg2">
-                      <a:lumMod val="25000"/>
-                    </a:schemeClr>
-                  </a:solidFill>
-                  <a:latin typeface="源ノ角ゴシック Code JP N" panose="020B0400000000000000" pitchFamily="34" charset="-128"/>
-                  <a:ea typeface="源ノ角ゴシック Code JP N" panose="020B0400000000000000" pitchFamily="34" charset="-128"/>
-                </a:rPr>
-                <a:t>、</a:t>
+                <a:t>モーター制御や画面表示などの、</a:t>
               </a:r>
               <a:endParaRPr lang="en-US" altLang="ja-JP" sz="800" dirty="0" smtClean="0">
                 <a:solidFill>
@@ -18056,19 +17817,7 @@
                   <a:latin typeface="源ノ角ゴシック Code JP N" panose="020B0400000000000000" pitchFamily="34" charset="-128"/>
                   <a:ea typeface="源ノ角ゴシック Code JP N" panose="020B0400000000000000" pitchFamily="34" charset="-128"/>
                 </a:rPr>
-                <a:t>ロボット</a:t>
-              </a:r>
-              <a:r>
-                <a:rPr lang="ja-JP" altLang="en-US" sz="800" dirty="0" smtClean="0">
-                  <a:solidFill>
-                    <a:schemeClr val="bg2">
-                      <a:lumMod val="25000"/>
-                    </a:schemeClr>
-                  </a:solidFill>
-                  <a:latin typeface="源ノ角ゴシック Code JP N" panose="020B0400000000000000" pitchFamily="34" charset="-128"/>
-                  <a:ea typeface="源ノ角ゴシック Code JP N" panose="020B0400000000000000" pitchFamily="34" charset="-128"/>
-                </a:rPr>
-                <a:t>制御を行っています。</a:t>
+                <a:t>ロボット制御を行っています。</a:t>
               </a:r>
               <a:endParaRPr lang="en-US" altLang="ja-JP" sz="800" dirty="0" smtClean="0">
                 <a:solidFill>
@@ -18138,31 +17887,7 @@
                   <a:latin typeface="源ノ角ゴシック Code JP N" panose="020B0400000000000000" pitchFamily="34" charset="-128"/>
                   <a:ea typeface="源ノ角ゴシック Code JP N" panose="020B0400000000000000" pitchFamily="34" charset="-128"/>
                 </a:rPr>
-                <a:t>使用していました</a:t>
-              </a:r>
-              <a:r>
-                <a:rPr lang="ja-JP" altLang="en-US" sz="800" dirty="0" smtClean="0">
-                  <a:solidFill>
-                    <a:schemeClr val="bg2">
-                      <a:lumMod val="25000"/>
-                    </a:schemeClr>
-                  </a:solidFill>
-                  <a:latin typeface="源ノ角ゴシック Code JP N" panose="020B0400000000000000" pitchFamily="34" charset="-128"/>
-                  <a:ea typeface="源ノ角ゴシック Code JP N" panose="020B0400000000000000" pitchFamily="34" charset="-128"/>
-                </a:rPr>
-                <a:t>が、入出力</a:t>
-              </a:r>
-              <a:r>
-                <a:rPr lang="ja-JP" altLang="en-US" sz="800" dirty="0" smtClean="0">
-                  <a:solidFill>
-                    <a:schemeClr val="bg2">
-                      <a:lumMod val="25000"/>
-                    </a:schemeClr>
-                  </a:solidFill>
-                  <a:latin typeface="源ノ角ゴシック Code JP N" panose="020B0400000000000000" pitchFamily="34" charset="-128"/>
-                  <a:ea typeface="源ノ角ゴシック Code JP N" panose="020B0400000000000000" pitchFamily="34" charset="-128"/>
-                </a:rPr>
-                <a:t>ピン数</a:t>
+                <a:t>使用していましたが、入出力ピン数</a:t>
               </a:r>
               <a:endParaRPr lang="en-US" altLang="ja-JP" sz="800" dirty="0" smtClean="0">
                 <a:solidFill>
@@ -18185,55 +17910,7 @@
                   <a:latin typeface="源ノ角ゴシック Code JP N" panose="020B0400000000000000" pitchFamily="34" charset="-128"/>
                   <a:ea typeface="源ノ角ゴシック Code JP N" panose="020B0400000000000000" pitchFamily="34" charset="-128"/>
                 </a:rPr>
-                <a:t>の</a:t>
-              </a:r>
-              <a:r>
-                <a:rPr lang="ja-JP" altLang="en-US" sz="800" dirty="0" smtClean="0">
-                  <a:solidFill>
-                    <a:schemeClr val="bg2">
-                      <a:lumMod val="25000"/>
-                    </a:schemeClr>
-                  </a:solidFill>
-                  <a:latin typeface="源ノ角ゴシック Code JP N" panose="020B0400000000000000" pitchFamily="34" charset="-128"/>
-                  <a:ea typeface="源ノ角ゴシック Code JP N" panose="020B0400000000000000" pitchFamily="34" charset="-128"/>
-                </a:rPr>
-                <a:t>多さや</a:t>
-              </a:r>
-              <a:r>
-                <a:rPr lang="ja-JP" altLang="en-US" sz="800" dirty="0" smtClean="0">
-                  <a:solidFill>
-                    <a:schemeClr val="bg2">
-                      <a:lumMod val="25000"/>
-                    </a:schemeClr>
-                  </a:solidFill>
-                  <a:latin typeface="源ノ角ゴシック Code JP N" panose="020B0400000000000000" pitchFamily="34" charset="-128"/>
-                  <a:ea typeface="源ノ角ゴシック Code JP N" panose="020B0400000000000000" pitchFamily="34" charset="-128"/>
-                </a:rPr>
-                <a:t>、処理</a:t>
-              </a:r>
-              <a:r>
-                <a:rPr lang="ja-JP" altLang="en-US" sz="800" dirty="0" smtClean="0">
-                  <a:solidFill>
-                    <a:schemeClr val="bg2">
-                      <a:lumMod val="25000"/>
-                    </a:schemeClr>
-                  </a:solidFill>
-                  <a:latin typeface="源ノ角ゴシック Code JP N" panose="020B0400000000000000" pitchFamily="34" charset="-128"/>
-                  <a:ea typeface="源ノ角ゴシック Code JP N" panose="020B0400000000000000" pitchFamily="34" charset="-128"/>
-                </a:rPr>
-                <a:t>性能の高さ</a:t>
-              </a:r>
-              <a:r>
-                <a:rPr lang="ja-JP" altLang="en-US" sz="800" dirty="0" smtClean="0">
-                  <a:solidFill>
-                    <a:schemeClr val="bg2">
-                      <a:lumMod val="25000"/>
-                    </a:schemeClr>
-                  </a:solidFill>
-                  <a:latin typeface="源ノ角ゴシック Code JP N" panose="020B0400000000000000" pitchFamily="34" charset="-128"/>
-                  <a:ea typeface="源ノ角ゴシック Code JP N" panose="020B0400000000000000" pitchFamily="34" charset="-128"/>
-                </a:rPr>
-                <a:t>から</a:t>
+                <a:t>の多さや、処理性能の高さから</a:t>
               </a:r>
               <a:endParaRPr lang="en-US" altLang="ja-JP" sz="800" dirty="0" smtClean="0">
                 <a:solidFill>
@@ -18256,19 +17933,7 @@
                   <a:latin typeface="源ノ角ゴシック Code JP N" panose="020B0400000000000000" pitchFamily="34" charset="-128"/>
                   <a:ea typeface="源ノ角ゴシック Code JP N" panose="020B0400000000000000" pitchFamily="34" charset="-128"/>
                 </a:rPr>
-                <a:t>こちら</a:t>
-              </a:r>
-              <a:r>
-                <a:rPr lang="ja-JP" altLang="en-US" sz="800" dirty="0" smtClean="0">
-                  <a:solidFill>
-                    <a:schemeClr val="bg2">
-                      <a:lumMod val="25000"/>
-                    </a:schemeClr>
-                  </a:solidFill>
-                  <a:latin typeface="源ノ角ゴシック Code JP N" panose="020B0400000000000000" pitchFamily="34" charset="-128"/>
-                  <a:ea typeface="源ノ角ゴシック Code JP N" panose="020B0400000000000000" pitchFamily="34" charset="-128"/>
-                </a:rPr>
-                <a:t>を採用しました。</a:t>
+                <a:t>こちらを採用しました。</a:t>
               </a:r>
               <a:endParaRPr lang="en-US" altLang="ja-JP" sz="800" dirty="0" smtClean="0">
                 <a:solidFill>
@@ -18355,7 +18020,7 @@
               <p:cNvPr id="400" name="四角形: 角を丸くする 11">
                 <a:extLst>
                   <a:ext uri="{FF2B5EF4-FFF2-40B4-BE49-F238E27FC236}">
-                    <a16:creationId xmlns="" xmlns:a16="http://schemas.microsoft.com/office/drawing/2014/main" id="{EFCF447B-DF4E-F420-B181-5ED79E9170AE}"/>
+                    <a16:creationId xmlns:a16="http://schemas.microsoft.com/office/drawing/2014/main" xmlns="" id="{EFCF447B-DF4E-F420-B181-5ED79E9170AE}"/>
                   </a:ext>
                 </a:extLst>
               </p:cNvPr>
@@ -18769,7 +18434,7 @@
             <p:cNvPr id="408" name="四角形: 角を丸くする 11">
               <a:extLst>
                 <a:ext uri="{FF2B5EF4-FFF2-40B4-BE49-F238E27FC236}">
-                  <a16:creationId xmlns="" xmlns:a16="http://schemas.microsoft.com/office/drawing/2014/main" id="{EFCF447B-DF4E-F420-B181-5ED79E9170AE}"/>
+                  <a16:creationId xmlns:a16="http://schemas.microsoft.com/office/drawing/2014/main" xmlns="" id="{EFCF447B-DF4E-F420-B181-5ED79E9170AE}"/>
                 </a:ext>
               </a:extLst>
             </p:cNvPr>
@@ -19217,7 +18882,7 @@
               <p:cNvPr id="404" name="四角形: 角を丸くする 11">
                 <a:extLst>
                   <a:ext uri="{FF2B5EF4-FFF2-40B4-BE49-F238E27FC236}">
-                    <a16:creationId xmlns="" xmlns:a16="http://schemas.microsoft.com/office/drawing/2014/main" id="{EFCF447B-DF4E-F420-B181-5ED79E9170AE}"/>
+                    <a16:creationId xmlns:a16="http://schemas.microsoft.com/office/drawing/2014/main" xmlns="" id="{EFCF447B-DF4E-F420-B181-5ED79E9170AE}"/>
                   </a:ext>
                 </a:extLst>
               </p:cNvPr>
@@ -19360,55 +19025,7 @@
                     <a:latin typeface="源ノ角ゴシック Code JP N" panose="020B0400000000000000" pitchFamily="34" charset="-128"/>
                     <a:ea typeface="源ノ角ゴシック Code JP N" panose="020B0400000000000000" pitchFamily="34" charset="-128"/>
                   </a:rPr>
-                  <a:t>ゴール</a:t>
-                </a:r>
-                <a:r>
-                  <a:rPr lang="ja-JP" altLang="en-US" sz="800" dirty="0" smtClean="0">
-                    <a:solidFill>
-                      <a:schemeClr val="bg2">
-                        <a:lumMod val="25000"/>
-                      </a:schemeClr>
-                    </a:solidFill>
-                    <a:latin typeface="源ノ角ゴシック Code JP N" panose="020B0400000000000000" pitchFamily="34" charset="-128"/>
-                    <a:ea typeface="源ノ角ゴシック Code JP N" panose="020B0400000000000000" pitchFamily="34" charset="-128"/>
-                  </a:rPr>
-                  <a:t>・コート</a:t>
-                </a:r>
-                <a:r>
-                  <a:rPr lang="ja-JP" altLang="en-US" sz="800" dirty="0" smtClean="0">
-                    <a:solidFill>
-                      <a:schemeClr val="bg2">
-                        <a:lumMod val="25000"/>
-                      </a:schemeClr>
-                    </a:solidFill>
-                    <a:latin typeface="源ノ角ゴシック Code JP N" panose="020B0400000000000000" pitchFamily="34" charset="-128"/>
-                    <a:ea typeface="源ノ角ゴシック Code JP N" panose="020B0400000000000000" pitchFamily="34" charset="-128"/>
-                  </a:rPr>
-                  <a:t>の角度</a:t>
-                </a:r>
-                <a:r>
-                  <a:rPr lang="ja-JP" altLang="en-US" sz="800" dirty="0" smtClean="0">
-                    <a:solidFill>
-                      <a:schemeClr val="bg2">
-                        <a:lumMod val="25000"/>
-                      </a:schemeClr>
-                    </a:solidFill>
-                    <a:latin typeface="源ノ角ゴシック Code JP N" panose="020B0400000000000000" pitchFamily="34" charset="-128"/>
-                    <a:ea typeface="源ノ角ゴシック Code JP N" panose="020B0400000000000000" pitchFamily="34" charset="-128"/>
-                  </a:rPr>
-                  <a:t>・距離</a:t>
-                </a:r>
-                <a:r>
-                  <a:rPr lang="ja-JP" altLang="en-US" sz="800" dirty="0" smtClean="0">
-                    <a:solidFill>
-                      <a:schemeClr val="bg2">
-                        <a:lumMod val="25000"/>
-                      </a:schemeClr>
-                    </a:solidFill>
-                    <a:latin typeface="源ノ角ゴシック Code JP N" panose="020B0400000000000000" pitchFamily="34" charset="-128"/>
-                    <a:ea typeface="源ノ角ゴシック Code JP N" panose="020B0400000000000000" pitchFamily="34" charset="-128"/>
-                  </a:rPr>
-                  <a:t>を</a:t>
+                  <a:t>ゴール・コートの角度・距離を</a:t>
                 </a:r>
                 <a:endParaRPr lang="en-US" altLang="ja-JP" sz="800" dirty="0" smtClean="0">
                   <a:solidFill>
@@ -19431,31 +19048,7 @@
                     <a:latin typeface="源ノ角ゴシック Code JP N" panose="020B0400000000000000" pitchFamily="34" charset="-128"/>
                     <a:ea typeface="源ノ角ゴシック Code JP N" panose="020B0400000000000000" pitchFamily="34" charset="-128"/>
                   </a:rPr>
-                  <a:t>計算</a:t>
-                </a:r>
-                <a:r>
-                  <a:rPr lang="ja-JP" altLang="en-US" sz="800" dirty="0" smtClean="0">
-                    <a:solidFill>
-                      <a:schemeClr val="bg2">
-                        <a:lumMod val="25000"/>
-                      </a:schemeClr>
-                    </a:solidFill>
-                    <a:latin typeface="源ノ角ゴシック Code JP N" panose="020B0400000000000000" pitchFamily="34" charset="-128"/>
-                    <a:ea typeface="源ノ角ゴシック Code JP N" panose="020B0400000000000000" pitchFamily="34" charset="-128"/>
-                  </a:rPr>
-                  <a:t>しています</a:t>
-                </a:r>
-                <a:r>
-                  <a:rPr lang="ja-JP" altLang="en-US" sz="800" dirty="0" smtClean="0">
-                    <a:solidFill>
-                      <a:schemeClr val="bg2">
-                        <a:lumMod val="25000"/>
-                      </a:schemeClr>
-                    </a:solidFill>
-                    <a:latin typeface="源ノ角ゴシック Code JP N" panose="020B0400000000000000" pitchFamily="34" charset="-128"/>
-                    <a:ea typeface="源ノ角ゴシック Code JP N" panose="020B0400000000000000" pitchFamily="34" charset="-128"/>
-                  </a:rPr>
-                  <a:t>。プログラムの</a:t>
+                  <a:t>計算しています。プログラムの</a:t>
                 </a:r>
                 <a:endParaRPr lang="en-US" altLang="ja-JP" sz="800" dirty="0" smtClean="0">
                   <a:solidFill>
@@ -19478,19 +19071,7 @@
                     <a:latin typeface="源ノ角ゴシック Code JP N" panose="020B0400000000000000" pitchFamily="34" charset="-128"/>
                     <a:ea typeface="源ノ角ゴシック Code JP N" panose="020B0400000000000000" pitchFamily="34" charset="-128"/>
                   </a:rPr>
-                  <a:t>しやすさ</a:t>
-                </a:r>
-                <a:r>
-                  <a:rPr lang="ja-JP" altLang="en-US" sz="800" dirty="0" smtClean="0">
-                    <a:solidFill>
-                      <a:schemeClr val="bg2">
-                        <a:lumMod val="25000"/>
-                      </a:schemeClr>
-                    </a:solidFill>
-                    <a:latin typeface="源ノ角ゴシック Code JP N" panose="020B0400000000000000" pitchFamily="34" charset="-128"/>
-                    <a:ea typeface="源ノ角ゴシック Code JP N" panose="020B0400000000000000" pitchFamily="34" charset="-128"/>
-                  </a:rPr>
-                  <a:t>や、入手性の高さ、</a:t>
+                  <a:t>しやすさや、入手性の高さ、</a:t>
                 </a:r>
                 <a:endParaRPr lang="en-US" altLang="ja-JP" sz="800" dirty="0" smtClean="0">
                   <a:solidFill>
@@ -19649,7 +19230,7 @@
             <p:cNvPr id="412" name="四角形: 角を丸くする 11">
               <a:extLst>
                 <a:ext uri="{FF2B5EF4-FFF2-40B4-BE49-F238E27FC236}">
-                  <a16:creationId xmlns="" xmlns:a16="http://schemas.microsoft.com/office/drawing/2014/main" id="{EFCF447B-DF4E-F420-B181-5ED79E9170AE}"/>
+                  <a16:creationId xmlns:a16="http://schemas.microsoft.com/office/drawing/2014/main" xmlns="" id="{EFCF447B-DF4E-F420-B181-5ED79E9170AE}"/>
                 </a:ext>
               </a:extLst>
             </p:cNvPr>
@@ -20143,7 +19724,7 @@
             <p:cNvPr id="416" name="四角形: 角を丸くする 11">
               <a:extLst>
                 <a:ext uri="{FF2B5EF4-FFF2-40B4-BE49-F238E27FC236}">
-                  <a16:creationId xmlns="" xmlns:a16="http://schemas.microsoft.com/office/drawing/2014/main" id="{EFCF447B-DF4E-F420-B181-5ED79E9170AE}"/>
+                  <a16:creationId xmlns:a16="http://schemas.microsoft.com/office/drawing/2014/main" xmlns="" id="{EFCF447B-DF4E-F420-B181-5ED79E9170AE}"/>
                 </a:ext>
               </a:extLst>
             </p:cNvPr>
@@ -20286,31 +19867,7 @@
                   <a:latin typeface="源ノ角ゴシック Code JP N" panose="020B0400000000000000" pitchFamily="34" charset="-128"/>
                   <a:ea typeface="源ノ角ゴシック Code JP N" panose="020B0400000000000000" pitchFamily="34" charset="-128"/>
                 </a:rPr>
-                <a:t>最初</a:t>
-              </a:r>
-              <a:r>
-                <a:rPr lang="ja-JP" altLang="en-US" sz="700" dirty="0" smtClean="0">
-                  <a:solidFill>
-                    <a:schemeClr val="bg2">
-                      <a:lumMod val="25000"/>
-                    </a:schemeClr>
-                  </a:solidFill>
-                  <a:latin typeface="源ノ角ゴシック Code JP N" panose="020B0400000000000000" pitchFamily="34" charset="-128"/>
-                  <a:ea typeface="源ノ角ゴシック Code JP N" panose="020B0400000000000000" pitchFamily="34" charset="-128"/>
-                </a:rPr>
-                <a:t>に向いて</a:t>
-              </a:r>
-              <a:r>
-                <a:rPr lang="ja-JP" altLang="en-US" sz="700" dirty="0" smtClean="0">
-                  <a:solidFill>
-                    <a:schemeClr val="bg2">
-                      <a:lumMod val="25000"/>
-                    </a:schemeClr>
-                  </a:solidFill>
-                  <a:latin typeface="源ノ角ゴシック Code JP N" panose="020B0400000000000000" pitchFamily="34" charset="-128"/>
-                  <a:ea typeface="源ノ角ゴシック Code JP N" panose="020B0400000000000000" pitchFamily="34" charset="-128"/>
-                </a:rPr>
-                <a:t>いた方向から</a:t>
+                <a:t>最初に向いていた方向から</a:t>
               </a:r>
               <a:endParaRPr lang="en-US" altLang="ja-JP" sz="700" dirty="0" smtClean="0">
                 <a:solidFill>
@@ -20333,31 +19890,7 @@
                   <a:latin typeface="源ノ角ゴシック Code JP N" panose="020B0400000000000000" pitchFamily="34" charset="-128"/>
                   <a:ea typeface="源ノ角ゴシック Code JP N" panose="020B0400000000000000" pitchFamily="34" charset="-128"/>
                 </a:rPr>
-                <a:t>どの</a:t>
-              </a:r>
-              <a:r>
-                <a:rPr lang="ja-JP" altLang="en-US" sz="700" dirty="0" smtClean="0">
-                  <a:solidFill>
-                    <a:schemeClr val="bg2">
-                      <a:lumMod val="25000"/>
-                    </a:schemeClr>
-                  </a:solidFill>
-                  <a:latin typeface="源ノ角ゴシック Code JP N" panose="020B0400000000000000" pitchFamily="34" charset="-128"/>
-                  <a:ea typeface="源ノ角ゴシック Code JP N" panose="020B0400000000000000" pitchFamily="34" charset="-128"/>
-                </a:rPr>
-                <a:t>くらい角度がずれて</a:t>
-              </a:r>
-              <a:r>
-                <a:rPr lang="ja-JP" altLang="en-US" sz="700" dirty="0" smtClean="0">
-                  <a:solidFill>
-                    <a:schemeClr val="bg2">
-                      <a:lumMod val="25000"/>
-                    </a:schemeClr>
-                  </a:solidFill>
-                  <a:latin typeface="源ノ角ゴシック Code JP N" panose="020B0400000000000000" pitchFamily="34" charset="-128"/>
-                  <a:ea typeface="源ノ角ゴシック Code JP N" panose="020B0400000000000000" pitchFamily="34" charset="-128"/>
-                </a:rPr>
-                <a:t>いるのか</a:t>
+                <a:t>どのくらい角度がずれているのか</a:t>
               </a:r>
               <a:endParaRPr lang="en-US" altLang="ja-JP" sz="700" dirty="0" smtClean="0">
                 <a:solidFill>
@@ -20380,19 +19913,7 @@
                   <a:latin typeface="源ノ角ゴシック Code JP N" panose="020B0400000000000000" pitchFamily="34" charset="-128"/>
                   <a:ea typeface="源ノ角ゴシック Code JP N" panose="020B0400000000000000" pitchFamily="34" charset="-128"/>
                 </a:rPr>
-                <a:t>計算</a:t>
-              </a:r>
-              <a:r>
-                <a:rPr lang="ja-JP" altLang="en-US" sz="700" dirty="0" smtClean="0">
-                  <a:solidFill>
-                    <a:schemeClr val="bg2">
-                      <a:lumMod val="25000"/>
-                    </a:schemeClr>
-                  </a:solidFill>
-                  <a:latin typeface="源ノ角ゴシック Code JP N" panose="020B0400000000000000" pitchFamily="34" charset="-128"/>
-                  <a:ea typeface="源ノ角ゴシック Code JP N" panose="020B0400000000000000" pitchFamily="34" charset="-128"/>
-                </a:rPr>
-                <a:t>し、ロボットの姿勢制御に</a:t>
+                <a:t>計算し、ロボットの姿勢制御に</a:t>
               </a:r>
               <a:endParaRPr lang="en-US" altLang="ja-JP" sz="700" dirty="0" smtClean="0">
                 <a:solidFill>
@@ -20438,31 +19959,7 @@
                   <a:latin typeface="源ノ角ゴシック Code JP N" panose="020B0400000000000000" pitchFamily="34" charset="-128"/>
                   <a:ea typeface="源ノ角ゴシック Code JP N" panose="020B0400000000000000" pitchFamily="34" charset="-128"/>
                 </a:rPr>
-                <a:t>センサよりもずれが小さく</a:t>
-              </a:r>
-              <a:r>
-                <a:rPr lang="ja-JP" altLang="en-US" sz="700" dirty="0" smtClean="0">
-                  <a:solidFill>
-                    <a:schemeClr val="bg2">
-                      <a:lumMod val="25000"/>
-                    </a:schemeClr>
-                  </a:solidFill>
-                  <a:latin typeface="源ノ角ゴシック Code JP N" panose="020B0400000000000000" pitchFamily="34" charset="-128"/>
-                  <a:ea typeface="源ノ角ゴシック Code JP N" panose="020B0400000000000000" pitchFamily="34" charset="-128"/>
-                </a:rPr>
-                <a:t>、</a:t>
-              </a:r>
-              <a:r>
-                <a:rPr lang="ja-JP" altLang="en-US" sz="700" dirty="0" smtClean="0">
-                  <a:solidFill>
-                    <a:schemeClr val="bg2">
-                      <a:lumMod val="25000"/>
-                    </a:schemeClr>
-                  </a:solidFill>
-                  <a:latin typeface="源ノ角ゴシック Code JP N" panose="020B0400000000000000" pitchFamily="34" charset="-128"/>
-                  <a:ea typeface="源ノ角ゴシック Code JP N" panose="020B0400000000000000" pitchFamily="34" charset="-128"/>
-                </a:rPr>
-                <a:t>エラーが</a:t>
+                <a:t>センサよりもずれが小さく、エラーが</a:t>
               </a:r>
               <a:endParaRPr lang="en-US" altLang="ja-JP" sz="700" dirty="0" smtClean="0">
                 <a:solidFill>
@@ -20485,19 +19982,7 @@
                   <a:latin typeface="源ノ角ゴシック Code JP N" panose="020B0400000000000000" pitchFamily="34" charset="-128"/>
                   <a:ea typeface="源ノ角ゴシック Code JP N" panose="020B0400000000000000" pitchFamily="34" charset="-128"/>
                 </a:rPr>
-                <a:t>少ないためこのセンサを採用</a:t>
-              </a:r>
-              <a:r>
-                <a:rPr lang="ja-JP" altLang="en-US" sz="700" dirty="0" smtClean="0">
-                  <a:solidFill>
-                    <a:schemeClr val="bg2">
-                      <a:lumMod val="25000"/>
-                    </a:schemeClr>
-                  </a:solidFill>
-                  <a:latin typeface="源ノ角ゴシック Code JP N" panose="020B0400000000000000" pitchFamily="34" charset="-128"/>
-                  <a:ea typeface="源ノ角ゴシック Code JP N" panose="020B0400000000000000" pitchFamily="34" charset="-128"/>
-                </a:rPr>
-                <a:t>しました</a:t>
+                <a:t>少ないためこのセンサを採用しました</a:t>
               </a:r>
               <a:r>
                 <a:rPr lang="ja-JP" altLang="en-US" sz="700" dirty="0">
@@ -20870,28 +20355,14 @@
                 <a:latin typeface="源ノ角ゴシック Code JP N" panose="020B0400000000000000" pitchFamily="34" charset="-128"/>
                 <a:ea typeface="源ノ角ゴシック Code JP N" panose="020B0400000000000000" pitchFamily="34" charset="-128"/>
               </a:rPr>
-              <a:t>しかし、この実験では、移動開始時は停止しているため、実際の試合で</a:t>
-            </a:r>
-            <a:r>
-              <a:rPr lang="ja-JP" altLang="en-US" sz="700" dirty="0" smtClean="0">
-                <a:latin typeface="源ノ角ゴシック Code JP N" panose="020B0400000000000000" pitchFamily="34" charset="-128"/>
-                <a:ea typeface="源ノ角ゴシック Code JP N" panose="020B0400000000000000" pitchFamily="34" charset="-128"/>
-              </a:rPr>
-              <a:t>は慣性によって、</a:t>
+              <a:t>しかし、この実験では、移動開始時は停止しているため、実際の試合では慣性によって、</a:t>
             </a:r>
             <a:r>
               <a:rPr kumimoji="1" lang="ja-JP" altLang="en-US" sz="700" dirty="0" smtClean="0">
                 <a:latin typeface="源ノ角ゴシック Code JP N" panose="020B0400000000000000" pitchFamily="34" charset="-128"/>
                 <a:ea typeface="源ノ角ゴシック Code JP N" panose="020B0400000000000000" pitchFamily="34" charset="-128"/>
               </a:rPr>
-              <a:t>同じ</a:t>
-            </a:r>
-            <a:r>
-              <a:rPr kumimoji="1" lang="ja-JP" altLang="en-US" sz="700" dirty="0" smtClean="0">
-                <a:latin typeface="源ノ角ゴシック Code JP N" panose="020B0400000000000000" pitchFamily="34" charset="-128"/>
-                <a:ea typeface="源ノ角ゴシック Code JP N" panose="020B0400000000000000" pitchFamily="34" charset="-128"/>
-              </a:rPr>
-              <a:t>モーター</a:t>
+              <a:t>同じモーター</a:t>
             </a:r>
             <a:r>
               <a:rPr lang="ja-JP" altLang="en-US" sz="700" dirty="0">
@@ -20905,42 +20376,14 @@
                 <a:latin typeface="源ノ角ゴシック Code JP N" panose="020B0400000000000000" pitchFamily="34" charset="-128"/>
                 <a:ea typeface="源ノ角ゴシック Code JP N" panose="020B0400000000000000" pitchFamily="34" charset="-128"/>
               </a:rPr>
-              <a:t>でも</a:t>
-            </a:r>
-            <a:r>
-              <a:rPr kumimoji="1" lang="ja-JP" altLang="en-US" sz="700" dirty="0" smtClean="0">
-                <a:latin typeface="源ノ角ゴシック Code JP N" panose="020B0400000000000000" pitchFamily="34" charset="-128"/>
-                <a:ea typeface="源ノ角ゴシック Code JP N" panose="020B0400000000000000" pitchFamily="34" charset="-128"/>
-              </a:rPr>
-              <a:t>ラインアウトする可能性があります。</a:t>
+              <a:t>でもラインアウトする可能性があります。</a:t>
             </a:r>
             <a:r>
               <a:rPr lang="ja-JP" altLang="en-US" sz="700" dirty="0" smtClean="0">
                 <a:latin typeface="源ノ角ゴシック Code JP N" panose="020B0400000000000000" pitchFamily="34" charset="-128"/>
                 <a:ea typeface="源ノ角ゴシック Code JP N" panose="020B0400000000000000" pitchFamily="34" charset="-128"/>
               </a:rPr>
-              <a:t>そのため</a:t>
-            </a:r>
-            <a:r>
-              <a:rPr lang="ja-JP" altLang="en-US" sz="700" dirty="0" smtClean="0">
-                <a:latin typeface="源ノ角ゴシック Code JP N" panose="020B0400000000000000" pitchFamily="34" charset="-128"/>
-                <a:ea typeface="源ノ角ゴシック Code JP N" panose="020B0400000000000000" pitchFamily="34" charset="-128"/>
-              </a:rPr>
-              <a:t>、この</a:t>
-            </a:r>
-            <a:r>
-              <a:rPr lang="ja-JP" altLang="en-US" sz="700" dirty="0" smtClean="0">
-                <a:latin typeface="源ノ角ゴシック Code JP N" panose="020B0400000000000000" pitchFamily="34" charset="-128"/>
-                <a:ea typeface="源ノ角ゴシック Code JP N" panose="020B0400000000000000" pitchFamily="34" charset="-128"/>
-              </a:rPr>
-              <a:t>結果</a:t>
-            </a:r>
-            <a:r>
-              <a:rPr lang="ja-JP" altLang="en-US" sz="700" dirty="0" smtClean="0">
-                <a:latin typeface="源ノ角ゴシック Code JP N" panose="020B0400000000000000" pitchFamily="34" charset="-128"/>
-                <a:ea typeface="源ノ角ゴシック Code JP N" panose="020B0400000000000000" pitchFamily="34" charset="-128"/>
-              </a:rPr>
-              <a:t>を</a:t>
+              <a:t>そのため、この結果を</a:t>
             </a:r>
             <a:endParaRPr lang="en-US" altLang="ja-JP" sz="700" dirty="0" smtClean="0">
               <a:latin typeface="源ノ角ゴシック Code JP N" panose="020B0400000000000000" pitchFamily="34" charset="-128"/>
@@ -20953,42 +20396,14 @@
                 <a:latin typeface="源ノ角ゴシック Code JP N" panose="020B0400000000000000" pitchFamily="34" charset="-128"/>
                 <a:ea typeface="源ノ角ゴシック Code JP N" panose="020B0400000000000000" pitchFamily="34" charset="-128"/>
               </a:rPr>
-              <a:t>参考</a:t>
-            </a:r>
-            <a:r>
-              <a:rPr lang="ja-JP" altLang="en-US" sz="700" dirty="0" smtClean="0">
-                <a:latin typeface="源ノ角ゴシック Code JP N" panose="020B0400000000000000" pitchFamily="34" charset="-128"/>
-                <a:ea typeface="源ノ角ゴシック Code JP N" panose="020B0400000000000000" pitchFamily="34" charset="-128"/>
-              </a:rPr>
-              <a:t>にしつつ、</a:t>
-            </a:r>
-            <a:r>
-              <a:rPr lang="ja-JP" altLang="en-US" sz="700" dirty="0" smtClean="0">
-                <a:latin typeface="源ノ角ゴシック Code JP N" panose="020B0400000000000000" pitchFamily="34" charset="-128"/>
-                <a:ea typeface="源ノ角ゴシック Code JP N" panose="020B0400000000000000" pitchFamily="34" charset="-128"/>
-              </a:rPr>
-              <a:t>どのような</a:t>
+              <a:t>参考にしつつ、どのような</a:t>
             </a:r>
             <a:r>
               <a:rPr kumimoji="1" lang="ja-JP" altLang="en-US" sz="700" dirty="0" smtClean="0">
                 <a:latin typeface="源ノ角ゴシック Code JP N" panose="020B0400000000000000" pitchFamily="34" charset="-128"/>
                 <a:ea typeface="源ノ角ゴシック Code JP N" panose="020B0400000000000000" pitchFamily="34" charset="-128"/>
               </a:rPr>
-              <a:t>処理</a:t>
-            </a:r>
-            <a:r>
-              <a:rPr kumimoji="1" lang="ja-JP" altLang="en-US" sz="700" dirty="0" smtClean="0">
-                <a:latin typeface="源ノ角ゴシック Code JP N" panose="020B0400000000000000" pitchFamily="34" charset="-128"/>
-                <a:ea typeface="源ノ角ゴシック Code JP N" panose="020B0400000000000000" pitchFamily="34" charset="-128"/>
-              </a:rPr>
-              <a:t>を</a:t>
-            </a:r>
-            <a:r>
-              <a:rPr kumimoji="1" lang="ja-JP" altLang="en-US" sz="700" dirty="0" smtClean="0">
-                <a:latin typeface="源ノ角ゴシック Code JP N" panose="020B0400000000000000" pitchFamily="34" charset="-128"/>
-                <a:ea typeface="源ノ角ゴシック Code JP N" panose="020B0400000000000000" pitchFamily="34" charset="-128"/>
-              </a:rPr>
-              <a:t>すれば</a:t>
+              <a:t>処理をすれば</a:t>
             </a:r>
             <a:endParaRPr kumimoji="1" lang="en-US" altLang="ja-JP" sz="700" dirty="0" smtClean="0">
               <a:latin typeface="源ノ角ゴシック Code JP N" panose="020B0400000000000000" pitchFamily="34" charset="-128"/>
@@ -21001,35 +20416,14 @@
                 <a:latin typeface="源ノ角ゴシック Code JP N" panose="020B0400000000000000" pitchFamily="34" charset="-128"/>
                 <a:ea typeface="源ノ角ゴシック Code JP N" panose="020B0400000000000000" pitchFamily="34" charset="-128"/>
               </a:rPr>
-              <a:t>ラインアウト</a:t>
-            </a:r>
-            <a:r>
-              <a:rPr kumimoji="1" lang="ja-JP" altLang="en-US" sz="700" dirty="0" smtClean="0">
-                <a:latin typeface="源ノ角ゴシック Code JP N" panose="020B0400000000000000" pitchFamily="34" charset="-128"/>
-                <a:ea typeface="源ノ角ゴシック Code JP N" panose="020B0400000000000000" pitchFamily="34" charset="-128"/>
-              </a:rPr>
-              <a:t>をしないギリギリで停止</a:t>
+              <a:t>ラインアウトをしないギリギリで停止</a:t>
             </a:r>
             <a:r>
               <a:rPr lang="ja-JP" altLang="en-US" sz="700" dirty="0" smtClean="0">
                 <a:latin typeface="源ノ角ゴシック Code JP N" panose="020B0400000000000000" pitchFamily="34" charset="-128"/>
                 <a:ea typeface="源ノ角ゴシック Code JP N" panose="020B0400000000000000" pitchFamily="34" charset="-128"/>
               </a:rPr>
-              <a:t>できるのかを調整していく必要</a:t>
-            </a:r>
-            <a:r>
-              <a:rPr lang="ja-JP" altLang="en-US" sz="700" dirty="0" smtClean="0">
-                <a:latin typeface="源ノ角ゴシック Code JP N" panose="020B0400000000000000" pitchFamily="34" charset="-128"/>
-                <a:ea typeface="源ノ角ゴシック Code JP N" panose="020B0400000000000000" pitchFamily="34" charset="-128"/>
-              </a:rPr>
-              <a:t>があります</a:t>
-            </a:r>
-            <a:r>
-              <a:rPr lang="ja-JP" altLang="en-US" sz="700" dirty="0" smtClean="0">
-                <a:latin typeface="源ノ角ゴシック Code JP N" panose="020B0400000000000000" pitchFamily="34" charset="-128"/>
-                <a:ea typeface="源ノ角ゴシック Code JP N" panose="020B0400000000000000" pitchFamily="34" charset="-128"/>
-              </a:rPr>
-              <a:t>。</a:t>
+              <a:t>できるのかを調整していく必要があります。</a:t>
             </a:r>
             <a:endParaRPr lang="en-US" altLang="ja-JP" sz="700" dirty="0" smtClean="0">
               <a:latin typeface="源ノ角ゴシック Code JP N" panose="020B0400000000000000" pitchFamily="34" charset="-128"/>
@@ -21303,14 +20697,7 @@
                 <a:latin typeface="源ノ角ゴシック Code JP N" panose="020B0400000000000000" pitchFamily="34" charset="-128"/>
                 <a:ea typeface="源ノ角ゴシック Code JP N" panose="020B0400000000000000" pitchFamily="34" charset="-128"/>
               </a:rPr>
-              <a:t>容量</a:t>
-            </a:r>
-            <a:r>
-              <a:rPr lang="ja-JP" altLang="en-US" sz="800" dirty="0" smtClean="0">
-                <a:latin typeface="源ノ角ゴシック Code JP N" panose="020B0400000000000000" pitchFamily="34" charset="-128"/>
-                <a:ea typeface="源ノ角ゴシック Code JP N" panose="020B0400000000000000" pitchFamily="34" charset="-128"/>
-              </a:rPr>
-              <a:t>を</a:t>
+              <a:t>容量を</a:t>
             </a:r>
             <a:r>
               <a:rPr lang="en-US" altLang="ja-JP" sz="800" dirty="0" smtClean="0">
@@ -21351,28 +20738,7 @@
                 <a:latin typeface="源ノ角ゴシック Code JP N" panose="020B0400000000000000" pitchFamily="34" charset="-128"/>
                 <a:ea typeface="源ノ角ゴシック Code JP N" panose="020B0400000000000000" pitchFamily="34" charset="-128"/>
               </a:rPr>
-              <a:t>変化</a:t>
-            </a:r>
-            <a:r>
-              <a:rPr lang="ja-JP" altLang="en-US" sz="800" dirty="0" smtClean="0">
-                <a:latin typeface="源ノ角ゴシック Code JP N" panose="020B0400000000000000" pitchFamily="34" charset="-128"/>
-                <a:ea typeface="源ノ角ゴシック Code JP N" panose="020B0400000000000000" pitchFamily="34" charset="-128"/>
-              </a:rPr>
-              <a:t>させた</a:t>
-            </a:r>
-            <a:r>
-              <a:rPr lang="ja-JP" altLang="en-US" sz="800" dirty="0" smtClean="0">
-                <a:latin typeface="源ノ角ゴシック Code JP N" panose="020B0400000000000000" pitchFamily="34" charset="-128"/>
-                <a:ea typeface="源ノ角ゴシック Code JP N" panose="020B0400000000000000" pitchFamily="34" charset="-128"/>
-              </a:rPr>
-              <a:t>時、</a:t>
-            </a:r>
-            <a:r>
-              <a:rPr lang="ja-JP" altLang="en-US" sz="800" dirty="0" smtClean="0">
-                <a:latin typeface="源ノ角ゴシック Code JP N" panose="020B0400000000000000" pitchFamily="34" charset="-128"/>
-                <a:ea typeface="源ノ角ゴシック Code JP N" panose="020B0400000000000000" pitchFamily="34" charset="-128"/>
-              </a:rPr>
-              <a:t>距離がほぼ</a:t>
+              <a:t>変化させた時、距離がほぼ</a:t>
             </a:r>
             <a:endParaRPr lang="en-US" altLang="ja-JP" sz="800" dirty="0" smtClean="0">
               <a:latin typeface="源ノ角ゴシック Code JP N" panose="020B0400000000000000" pitchFamily="34" charset="-128"/>
@@ -21385,14 +20751,7 @@
                 <a:latin typeface="源ノ角ゴシック Code JP N" panose="020B0400000000000000" pitchFamily="34" charset="-128"/>
                 <a:ea typeface="源ノ角ゴシック Code JP N" panose="020B0400000000000000" pitchFamily="34" charset="-128"/>
               </a:rPr>
-              <a:t>一次関数的に</a:t>
-            </a:r>
-            <a:r>
-              <a:rPr lang="ja-JP" altLang="en-US" sz="800" dirty="0" smtClean="0">
-                <a:latin typeface="源ノ角ゴシック Code JP N" panose="020B0400000000000000" pitchFamily="34" charset="-128"/>
-                <a:ea typeface="源ノ角ゴシック Code JP N" panose="020B0400000000000000" pitchFamily="34" charset="-128"/>
-              </a:rPr>
-              <a:t>伸びていくことがわかりました。</a:t>
+              <a:t>一次関数的に伸びていくことがわかりました。</a:t>
             </a:r>
             <a:endParaRPr lang="en-US" altLang="ja-JP" sz="800" dirty="0" smtClean="0">
               <a:latin typeface="源ノ角ゴシック Code JP N" panose="020B0400000000000000" pitchFamily="34" charset="-128"/>
@@ -21439,21 +20798,7 @@
                 <a:latin typeface="源ノ角ゴシック Code JP N" panose="020B0400000000000000" pitchFamily="34" charset="-128"/>
                 <a:ea typeface="源ノ角ゴシック Code JP N" panose="020B0400000000000000" pitchFamily="34" charset="-128"/>
               </a:rPr>
-              <a:t>で変化</a:t>
-            </a:r>
-            <a:r>
-              <a:rPr lang="ja-JP" altLang="en-US" sz="800" dirty="0" smtClean="0">
-                <a:latin typeface="源ノ角ゴシック Code JP N" panose="020B0400000000000000" pitchFamily="34" charset="-128"/>
-                <a:ea typeface="源ノ角ゴシック Code JP N" panose="020B0400000000000000" pitchFamily="34" charset="-128"/>
-              </a:rPr>
-              <a:t>させた</a:t>
-            </a:r>
-            <a:r>
-              <a:rPr lang="ja-JP" altLang="en-US" sz="800" dirty="0" smtClean="0">
-                <a:latin typeface="源ノ角ゴシック Code JP N" panose="020B0400000000000000" pitchFamily="34" charset="-128"/>
-                <a:ea typeface="源ノ角ゴシック Code JP N" panose="020B0400000000000000" pitchFamily="34" charset="-128"/>
-              </a:rPr>
-              <a:t>時も</a:t>
+              <a:t>で変化させた時も</a:t>
             </a:r>
             <a:endParaRPr lang="en-US" altLang="ja-JP" sz="800" dirty="0" smtClean="0">
               <a:latin typeface="源ノ角ゴシック Code JP N" panose="020B0400000000000000" pitchFamily="34" charset="-128"/>
@@ -21479,21 +20824,7 @@
                 <a:latin typeface="源ノ角ゴシック Code JP N" panose="020B0400000000000000" pitchFamily="34" charset="-128"/>
                 <a:ea typeface="源ノ角ゴシック Code JP N" panose="020B0400000000000000" pitchFamily="34" charset="-128"/>
               </a:rPr>
-              <a:t>変化</a:t>
-            </a:r>
-            <a:r>
-              <a:rPr lang="ja-JP" altLang="en-US" sz="800" dirty="0" smtClean="0">
-                <a:latin typeface="源ノ角ゴシック Code JP N" panose="020B0400000000000000" pitchFamily="34" charset="-128"/>
-                <a:ea typeface="源ノ角ゴシック Code JP N" panose="020B0400000000000000" pitchFamily="34" charset="-128"/>
-              </a:rPr>
-              <a:t>して</a:t>
-            </a:r>
-            <a:r>
-              <a:rPr lang="ja-JP" altLang="en-US" sz="800" dirty="0" smtClean="0">
-                <a:latin typeface="源ノ角ゴシック Code JP N" panose="020B0400000000000000" pitchFamily="34" charset="-128"/>
-                <a:ea typeface="源ノ角ゴシック Code JP N" panose="020B0400000000000000" pitchFamily="34" charset="-128"/>
-              </a:rPr>
-              <a:t>いることが</a:t>
+              <a:t>変化していることが</a:t>
             </a:r>
             <a:endParaRPr lang="en-US" altLang="ja-JP" sz="800" dirty="0" smtClean="0">
               <a:latin typeface="源ノ角ゴシック Code JP N" panose="020B0400000000000000" pitchFamily="34" charset="-128"/>
@@ -21506,14 +20837,7 @@
                 <a:latin typeface="源ノ角ゴシック Code JP N" panose="020B0400000000000000" pitchFamily="34" charset="-128"/>
                 <a:ea typeface="源ノ角ゴシック Code JP N" panose="020B0400000000000000" pitchFamily="34" charset="-128"/>
               </a:rPr>
-              <a:t>わかりました</a:t>
-            </a:r>
-            <a:r>
-              <a:rPr lang="ja-JP" altLang="en-US" sz="800" dirty="0" smtClean="0">
-                <a:latin typeface="源ノ角ゴシック Code JP N" panose="020B0400000000000000" pitchFamily="34" charset="-128"/>
-                <a:ea typeface="源ノ角ゴシック Code JP N" panose="020B0400000000000000" pitchFamily="34" charset="-128"/>
-              </a:rPr>
-              <a:t>。</a:t>
+              <a:t>わかりました。</a:t>
             </a:r>
             <a:endParaRPr lang="en-US" altLang="ja-JP" sz="800" dirty="0" smtClean="0">
               <a:latin typeface="源ノ角ゴシック Code JP N" panose="020B0400000000000000" pitchFamily="34" charset="-128"/>
@@ -21526,14 +20850,7 @@
                 <a:latin typeface="源ノ角ゴシック Code JP N" panose="020B0400000000000000" pitchFamily="34" charset="-128"/>
                 <a:ea typeface="源ノ角ゴシック Code JP N" panose="020B0400000000000000" pitchFamily="34" charset="-128"/>
               </a:rPr>
-              <a:t>このような結果から、コンデンサの容量</a:t>
-            </a:r>
-            <a:r>
-              <a:rPr lang="ja-JP" altLang="en-US" sz="800" dirty="0" smtClean="0">
-                <a:latin typeface="源ノ角ゴシック Code JP N" panose="020B0400000000000000" pitchFamily="34" charset="-128"/>
-                <a:ea typeface="源ノ角ゴシック Code JP N" panose="020B0400000000000000" pitchFamily="34" charset="-128"/>
-              </a:rPr>
-              <a:t>を</a:t>
+              <a:t>このような結果から、コンデンサの容量を</a:t>
             </a:r>
             <a:r>
               <a:rPr lang="ja-JP" altLang="en-US" sz="800" dirty="0">
@@ -21547,21 +20864,7 @@
                 <a:latin typeface="源ノ角ゴシック Code JP N" panose="020B0400000000000000" pitchFamily="34" charset="-128"/>
                 <a:ea typeface="源ノ角ゴシック Code JP N" panose="020B0400000000000000" pitchFamily="34" charset="-128"/>
               </a:rPr>
-              <a:t>きく</a:t>
-            </a:r>
-            <a:r>
-              <a:rPr lang="ja-JP" altLang="en-US" sz="800" dirty="0" smtClean="0">
-                <a:latin typeface="源ノ角ゴシック Code JP N" panose="020B0400000000000000" pitchFamily="34" charset="-128"/>
-                <a:ea typeface="源ノ角ゴシック Code JP N" panose="020B0400000000000000" pitchFamily="34" charset="-128"/>
-              </a:rPr>
-              <a:t>、</a:t>
-            </a:r>
-            <a:r>
-              <a:rPr lang="ja-JP" altLang="en-US" sz="800" dirty="0" smtClean="0">
-                <a:latin typeface="源ノ角ゴシック Code JP N" panose="020B0400000000000000" pitchFamily="34" charset="-128"/>
-                <a:ea typeface="源ノ角ゴシック Code JP N" panose="020B0400000000000000" pitchFamily="34" charset="-128"/>
-              </a:rPr>
-              <a:t>電圧を高く</a:t>
+              <a:t>きく、電圧を高く</a:t>
             </a:r>
             <a:endParaRPr lang="en-US" altLang="ja-JP" sz="800" dirty="0" smtClean="0">
               <a:latin typeface="源ノ角ゴシック Code JP N" panose="020B0400000000000000" pitchFamily="34" charset="-128"/>
@@ -21587,21 +20890,7 @@
                 <a:latin typeface="源ノ角ゴシック Code JP N" panose="020B0400000000000000" pitchFamily="34" charset="-128"/>
                 <a:ea typeface="源ノ角ゴシック Code JP N" panose="020B0400000000000000" pitchFamily="34" charset="-128"/>
               </a:rPr>
-              <a:t>載</a:t>
-            </a:r>
-            <a:r>
-              <a:rPr lang="ja-JP" altLang="en-US" sz="800" dirty="0" smtClean="0">
-                <a:latin typeface="源ノ角ゴシック Code JP N" panose="020B0400000000000000" pitchFamily="34" charset="-128"/>
-                <a:ea typeface="源ノ角ゴシック Code JP N" panose="020B0400000000000000" pitchFamily="34" charset="-128"/>
-              </a:rPr>
-              <a:t>せる</a:t>
-            </a:r>
-            <a:r>
-              <a:rPr lang="ja-JP" altLang="en-US" sz="800" dirty="0" smtClean="0">
-                <a:latin typeface="源ノ角ゴシック Code JP N" panose="020B0400000000000000" pitchFamily="34" charset="-128"/>
-                <a:ea typeface="源ノ角ゴシック Code JP N" panose="020B0400000000000000" pitchFamily="34" charset="-128"/>
-              </a:rPr>
-              <a:t>ことのできる最大サイズの</a:t>
+              <a:t>載せることのできる最大サイズの</a:t>
             </a:r>
             <a:r>
               <a:rPr lang="en-US" altLang="ja-JP" sz="800" dirty="0" smtClean="0">
@@ -21882,8 +21171,8 @@
         </p:blipFill>
         <p:spPr bwMode="auto">
           <a:xfrm>
-            <a:off x="8110628" y="9798846"/>
-            <a:ext cx="700588" cy="700588"/>
+            <a:off x="8122204" y="9899456"/>
+            <a:ext cx="633329" cy="633329"/>
           </a:xfrm>
           <a:prstGeom prst="rect">
             <a:avLst/>

</xml_diff>